<commit_message>
clean_start_2 added summary updated pp
</commit_message>
<xml_diff>
--- a/Analysis of th MET.pptx
+++ b/Analysis of th MET.pptx
@@ -272,7 +272,7 @@
           <a:p>
             <a:fld id="{8FC04297-0A4E-4A07-84A0-4091E8BEFAFA}" type="datetimeFigureOut">
               <a:rPr lang="en-US" smtClean="0"/>
-              <a:t>2/6/2021</a:t>
+              <a:t>6/27/2021</a:t>
             </a:fld>
             <a:endParaRPr lang="en-US"/>
           </a:p>
@@ -470,7 +470,7 @@
           <a:p>
             <a:fld id="{8FC04297-0A4E-4A07-84A0-4091E8BEFAFA}" type="datetimeFigureOut">
               <a:rPr lang="en-US" smtClean="0"/>
-              <a:t>2/6/2021</a:t>
+              <a:t>6/27/2021</a:t>
             </a:fld>
             <a:endParaRPr lang="en-US"/>
           </a:p>
@@ -678,7 +678,7 @@
           <a:p>
             <a:fld id="{8FC04297-0A4E-4A07-84A0-4091E8BEFAFA}" type="datetimeFigureOut">
               <a:rPr lang="en-US" smtClean="0"/>
-              <a:t>2/6/2021</a:t>
+              <a:t>6/27/2021</a:t>
             </a:fld>
             <a:endParaRPr lang="en-US"/>
           </a:p>
@@ -876,7 +876,7 @@
           <a:p>
             <a:fld id="{8FC04297-0A4E-4A07-84A0-4091E8BEFAFA}" type="datetimeFigureOut">
               <a:rPr lang="en-US" smtClean="0"/>
-              <a:t>2/6/2021</a:t>
+              <a:t>6/27/2021</a:t>
             </a:fld>
             <a:endParaRPr lang="en-US"/>
           </a:p>
@@ -1151,7 +1151,7 @@
           <a:p>
             <a:fld id="{8FC04297-0A4E-4A07-84A0-4091E8BEFAFA}" type="datetimeFigureOut">
               <a:rPr lang="en-US" smtClean="0"/>
-              <a:t>2/6/2021</a:t>
+              <a:t>6/27/2021</a:t>
             </a:fld>
             <a:endParaRPr lang="en-US"/>
           </a:p>
@@ -1416,7 +1416,7 @@
           <a:p>
             <a:fld id="{8FC04297-0A4E-4A07-84A0-4091E8BEFAFA}" type="datetimeFigureOut">
               <a:rPr lang="en-US" smtClean="0"/>
-              <a:t>2/6/2021</a:t>
+              <a:t>6/27/2021</a:t>
             </a:fld>
             <a:endParaRPr lang="en-US"/>
           </a:p>
@@ -1828,7 +1828,7 @@
           <a:p>
             <a:fld id="{8FC04297-0A4E-4A07-84A0-4091E8BEFAFA}" type="datetimeFigureOut">
               <a:rPr lang="en-US" smtClean="0"/>
-              <a:t>2/6/2021</a:t>
+              <a:t>6/27/2021</a:t>
             </a:fld>
             <a:endParaRPr lang="en-US"/>
           </a:p>
@@ -1969,7 +1969,7 @@
           <a:p>
             <a:fld id="{8FC04297-0A4E-4A07-84A0-4091E8BEFAFA}" type="datetimeFigureOut">
               <a:rPr lang="en-US" smtClean="0"/>
-              <a:t>2/6/2021</a:t>
+              <a:t>6/27/2021</a:t>
             </a:fld>
             <a:endParaRPr lang="en-US"/>
           </a:p>
@@ -2082,7 +2082,7 @@
           <a:p>
             <a:fld id="{8FC04297-0A4E-4A07-84A0-4091E8BEFAFA}" type="datetimeFigureOut">
               <a:rPr lang="en-US" smtClean="0"/>
-              <a:t>2/6/2021</a:t>
+              <a:t>6/27/2021</a:t>
             </a:fld>
             <a:endParaRPr lang="en-US"/>
           </a:p>
@@ -2393,7 +2393,7 @@
           <a:p>
             <a:fld id="{8FC04297-0A4E-4A07-84A0-4091E8BEFAFA}" type="datetimeFigureOut">
               <a:rPr lang="en-US" smtClean="0"/>
-              <a:t>2/6/2021</a:t>
+              <a:t>6/27/2021</a:t>
             </a:fld>
             <a:endParaRPr lang="en-US"/>
           </a:p>
@@ -2681,7 +2681,7 @@
           <a:p>
             <a:fld id="{8FC04297-0A4E-4A07-84A0-4091E8BEFAFA}" type="datetimeFigureOut">
               <a:rPr lang="en-US" smtClean="0"/>
-              <a:t>2/6/2021</a:t>
+              <a:t>6/27/2021</a:t>
             </a:fld>
             <a:endParaRPr lang="en-US"/>
           </a:p>
@@ -2943,7 +2943,7 @@
           <a:p>
             <a:fld id="{8FC04297-0A4E-4A07-84A0-4091E8BEFAFA}" type="datetimeFigureOut">
               <a:rPr lang="en-US" smtClean="0"/>
-              <a:t>2/6/2021</a:t>
+              <a:t>6/27/2021</a:t>
             </a:fld>
             <a:endParaRPr lang="en-US"/>
           </a:p>
@@ -3444,33 +3444,31 @@
         </p:nvSpPr>
         <p:spPr>
           <a:xfrm>
-            <a:off x="1524000" y="5049837"/>
-            <a:ext cx="9144000" cy="685800"/>
+            <a:off x="1524000" y="5364160"/>
+            <a:ext cx="9144000" cy="1523683"/>
           </a:xfrm>
         </p:spPr>
         <p:txBody>
           <a:bodyPr>
-            <a:normAutofit fontScale="85000" lnSpcReduction="20000"/>
+            <a:normAutofit/>
           </a:bodyPr>
           <a:lstStyle/>
           <a:p>
             <a:r>
-              <a:rPr lang="en-US"/>
-              <a:t>February 6, 2021</a:t>
-            </a:r>
-          </a:p>
-          <a:p>
-            <a:r>
               <a:rPr lang="en-US" dirty="0"/>
-              <a:t>TJ </a:t>
-            </a:r>
-            <a:r>
-              <a:rPr lang="en-US" dirty="0" err="1"/>
-              <a:t>Ossola</a:t>
-            </a:r>
+              <a:t> Reevaluation of Analysis conducted February 6, 2021</a:t>
+            </a:r>
+          </a:p>
+          <a:p>
             <a:r>
               <a:rPr lang="en-US" dirty="0"/>
-              <a:t> and Bryce Wilkinson</a:t>
+              <a:t>TJ Ossola and Bryce Wilkinson </a:t>
+            </a:r>
+          </a:p>
+          <a:p>
+            <a:r>
+              <a:rPr lang="en-US" dirty="0"/>
+              <a:t>https://github.com/MtSopris/TheMetTeamProject</a:t>
             </a:r>
           </a:p>
         </p:txBody>
@@ -4554,40 +4552,39 @@
           </a:solidFill>
         </p:spPr>
         <p:txBody>
-          <a:bodyPr/>
-          <a:lstStyle/>
-          <a:p>
-            <a:r>
-              <a:rPr lang="en-US" dirty="0"/>
+          <a:bodyPr>
+            <a:normAutofit lnSpcReduction="10000"/>
+          </a:bodyPr>
+          <a:lstStyle/>
+          <a:p>
+            <a:r>
+              <a:rPr lang="en-US" sz="2600" dirty="0"/>
               <a:t>Founded in 1870.</a:t>
             </a:r>
           </a:p>
           <a:p>
             <a:r>
-              <a:rPr lang="en-US" dirty="0"/>
+              <a:rPr lang="en-US" sz="2600" dirty="0"/>
               <a:t>Largest art museum in the United States.</a:t>
             </a:r>
           </a:p>
           <a:p>
             <a:r>
-              <a:rPr lang="en-US" dirty="0"/>
+              <a:rPr lang="en-US" sz="2600" dirty="0"/>
               <a:t>The permanent collection contains over two million works.</a:t>
             </a:r>
           </a:p>
           <a:p>
             <a:r>
-              <a:rPr lang="en-US" dirty="0"/>
+              <a:rPr lang="en-US" sz="2600" dirty="0"/>
               <a:t>Works of art from classical antiquity and ancient Egypt through the modern era.</a:t>
             </a:r>
           </a:p>
           <a:p>
             <a:r>
-              <a:rPr lang="en-US" dirty="0"/>
-              <a:t>Extensive collections of musical instruments, costumes, accessories, antique weapons, and armor from around the world.  </a:t>
-            </a:r>
-          </a:p>
-          <a:p>
-            <a:endParaRPr lang="en-US" dirty="0"/>
+              <a:rPr lang="en-US" sz="2600" dirty="0"/>
+              <a:t>The mission of The Metropolitan Museum of Art is to collect, preserve, study, exhibit, and stimulate appreciation for and advance knowledge of works of art that collectively represent the broadest spectrum of human achievement at the highest level of quality, all in the service of the public and in accordance with the highest professional standards.</a:t>
+            </a:r>
           </a:p>
           <a:p>
             <a:pPr marL="0" indent="0">
@@ -4771,26 +4768,8 @@
                 <a:effectLst/>
                 <a:latin typeface="-apple-system"/>
               </a:rPr>
-              <a:t>We used a CSV which we cleaned to remove blank</a:t>
-            </a:r>
-            <a:r>
-              <a:rPr lang="en-US" dirty="0">
-                <a:solidFill>
-                  <a:srgbClr val="24292E"/>
-                </a:solidFill>
-                <a:latin typeface="-apple-system"/>
-              </a:rPr>
-              <a:t>s in country and then narrowed to countries with 20 or more objects for analysis.</a:t>
-            </a:r>
-            <a:endParaRPr lang="en-US" b="0" i="0" dirty="0">
-              <a:solidFill>
-                <a:srgbClr val="24292E"/>
-              </a:solidFill>
-              <a:effectLst/>
-              <a:latin typeface="-apple-system"/>
-            </a:endParaRPr>
-          </a:p>
-          <a:p>
+              <a:t>For this analysis the CSV was collected from GitHub (6/27/2021)</a:t>
+            </a:r>
             <a:endParaRPr lang="en-US" dirty="0"/>
           </a:p>
           <a:p>
@@ -4882,9 +4861,10 @@
           <a:bodyPr/>
           <a:lstStyle/>
           <a:p>
-            <a:r>
-              <a:rPr lang="en-US" dirty="0"/>
-              <a:t>Summary of the Dataset We Used</a:t>
+            <a:pPr algn="ctr"/>
+            <a:r>
+              <a:rPr lang="en-US" b="1" dirty="0"/>
+              <a:t>Summary of the Dataset Used</a:t>
             </a:r>
           </a:p>
         </p:txBody>
@@ -5046,7 +5026,7 @@
           <p:nvPr>
             <p:extLst>
               <p:ext uri="{D42A27DB-BD31-4B8C-83A1-F6EECF244321}">
-                <p14:modId xmlns:p14="http://schemas.microsoft.com/office/powerpoint/2010/main" val="2921822682"/>
+                <p14:modId xmlns:p14="http://schemas.microsoft.com/office/powerpoint/2010/main" val="3746028280"/>
               </p:ext>
             </p:extLst>
           </p:nvPr>
@@ -5085,7 +5065,7 @@
                     <a:p>
                       <a:r>
                         <a:rPr lang="en-US" sz="2000" b="1" dirty="0"/>
-                        <a:t>Total Countries</a:t>
+                        <a:t>Total Countries (unique)</a:t>
                       </a:r>
                     </a:p>
                   </a:txBody>
@@ -5098,7 +5078,7 @@
                     <a:p>
                       <a:r>
                         <a:rPr lang="en-US" sz="2000" b="1" dirty="0"/>
-                        <a:t>72</a:t>
+                        <a:t>934</a:t>
                       </a:r>
                     </a:p>
                   </a:txBody>
@@ -5131,7 +5111,7 @@
                     <a:p>
                       <a:r>
                         <a:rPr lang="en-US" sz="2000" b="1" dirty="0"/>
-                        <a:t>29,318</a:t>
+                        <a:t>475,801</a:t>
                       </a:r>
                     </a:p>
                   </a:txBody>
@@ -5151,7 +5131,7 @@
                     <a:p>
                       <a:r>
                         <a:rPr lang="en-US" sz="2000" b="1" dirty="0"/>
-                        <a:t>Total Object Types</a:t>
+                        <a:t>Top 25 Object Classifications</a:t>
                       </a:r>
                     </a:p>
                   </a:txBody>
@@ -5164,7 +5144,7 @@
                     <a:p>
                       <a:r>
                         <a:rPr lang="en-US" sz="2000" b="1" dirty="0"/>
-                        <a:t>39</a:t>
+                        <a:t>25</a:t>
                       </a:r>
                     </a:p>
                   </a:txBody>
@@ -5197,7 +5177,7 @@
                     <a:p>
                       <a:r>
                         <a:rPr lang="en-US" sz="2000" b="1" dirty="0"/>
-                        <a:t>407</a:t>
+                        <a:t>77</a:t>
                       </a:r>
                     </a:p>
                   </a:txBody>
@@ -5230,7 +5210,7 @@
                     <a:p>
                       <a:r>
                         <a:rPr lang="en-US" sz="2000" b="1" dirty="0"/>
-                        <a:t>573 years</a:t>
+                        <a:t>626 years</a:t>
                       </a:r>
                     </a:p>
                   </a:txBody>
@@ -5263,7 +5243,7 @@
                     <a:p>
                       <a:r>
                         <a:rPr lang="en-US" sz="2000" b="1" dirty="0"/>
-                        <a:t>221 years</a:t>
+                        <a:t>186 years</a:t>
                       </a:r>
                     </a:p>
                   </a:txBody>
@@ -5296,7 +5276,7 @@
                     <a:p>
                       <a:r>
                         <a:rPr lang="en-US" sz="2000" b="1" dirty="0"/>
-                        <a:t>63 years</a:t>
+                        <a:t>66 years</a:t>
                       </a:r>
                     </a:p>
                   </a:txBody>
@@ -5329,7 +5309,7 @@
                     <a:p>
                       <a:r>
                         <a:rPr lang="en-US" sz="2000" b="1" dirty="0"/>
-                        <a:t>54 years</a:t>
+                        <a:t>63 years</a:t>
                       </a:r>
                     </a:p>
                   </a:txBody>
@@ -5362,7 +5342,7 @@
                     <a:p>
                       <a:r>
                         <a:rPr lang="en-US" sz="2000" b="1" dirty="0"/>
-                        <a:t>5,092</a:t>
+                        <a:t>4,302</a:t>
                       </a:r>
                     </a:p>
                   </a:txBody>
@@ -5627,10 +5607,10 @@
       </p:sp>
       <p:pic>
         <p:nvPicPr>
-          <p:cNvPr id="5" name="Content Placeholder 4">
-            <a:extLst>
-              <a:ext uri="{FF2B5EF4-FFF2-40B4-BE49-F238E27FC236}">
-                <a16:creationId xmlns:a16="http://schemas.microsoft.com/office/drawing/2014/main" id="{6EAECADF-1719-4B6A-B2A1-29105BD40D07}"/>
+          <p:cNvPr id="7" name="Content Placeholder 6">
+            <a:extLst>
+              <a:ext uri="{FF2B5EF4-FFF2-40B4-BE49-F238E27FC236}">
+                <a16:creationId xmlns:a16="http://schemas.microsoft.com/office/drawing/2014/main" id="{C5E642F6-6625-4DA5-A0F0-A632D45FA328}"/>
               </a:ext>
             </a:extLst>
           </p:cNvPr>
@@ -5655,8 +5635,8 @@
         </p:blipFill>
         <p:spPr>
           <a:xfrm>
-            <a:off x="2421082" y="1551350"/>
-            <a:ext cx="7349836" cy="4899888"/>
+            <a:off x="2001520" y="1468067"/>
+            <a:ext cx="7061200" cy="4707466"/>
           </a:xfrm>
         </p:spPr>
       </p:pic>
@@ -5743,10 +5723,10 @@
       </p:sp>
       <p:pic>
         <p:nvPicPr>
-          <p:cNvPr id="5" name="Content Placeholder 4">
-            <a:extLst>
-              <a:ext uri="{FF2B5EF4-FFF2-40B4-BE49-F238E27FC236}">
-                <a16:creationId xmlns:a16="http://schemas.microsoft.com/office/drawing/2014/main" id="{7ED40A56-187F-4F99-B572-53D08DE35B57}"/>
+          <p:cNvPr id="7" name="Content Placeholder 6">
+            <a:extLst>
+              <a:ext uri="{FF2B5EF4-FFF2-40B4-BE49-F238E27FC236}">
+                <a16:creationId xmlns:a16="http://schemas.microsoft.com/office/drawing/2014/main" id="{CBFFFC5D-25C2-4CF2-872D-170BDBAB0E8F}"/>
               </a:ext>
             </a:extLst>
           </p:cNvPr>
@@ -5771,18 +5751,9 @@
         </p:blipFill>
         <p:spPr>
           <a:xfrm>
-            <a:off x="80089" y="1647507"/>
-            <a:ext cx="12031822" cy="4707574"/>
+            <a:off x="741680" y="1454158"/>
+            <a:ext cx="10846810" cy="5160002"/>
           </a:xfrm>
-          <a:effectLst>
-            <a:glow rad="127000">
-              <a:schemeClr val="accent1"/>
-            </a:glow>
-            <a:outerShdw blurRad="50800" dist="50800" dir="5400000" algn="ctr" rotWithShape="0">
-              <a:srgbClr val="000000"/>
-            </a:outerShdw>
-            <a:reflection stA="6000" endPos="65000" dist="50800" dir="5400000" sy="-100000" algn="bl" rotWithShape="0"/>
-          </a:effectLst>
         </p:spPr>
       </p:pic>
     </p:spTree>

</xml_diff>

<commit_message>
refined plots and completed pp
</commit_message>
<xml_diff>
--- a/Analysis of th MET.pptx
+++ b/Analysis of th MET.pptx
@@ -15,10 +15,9 @@
     <p:sldId id="261" r:id="rId9"/>
     <p:sldId id="267" r:id="rId10"/>
     <p:sldId id="264" r:id="rId11"/>
-    <p:sldId id="266" r:id="rId12"/>
-    <p:sldId id="265" r:id="rId13"/>
-    <p:sldId id="268" r:id="rId14"/>
-    <p:sldId id="269" r:id="rId15"/>
+    <p:sldId id="268" r:id="rId12"/>
+    <p:sldId id="270" r:id="rId13"/>
+    <p:sldId id="269" r:id="rId14"/>
   </p:sldIdLst>
   <p:sldSz cx="12192000" cy="6858000"/>
   <p:notesSz cx="6858000" cy="9144000"/>
@@ -272,7 +271,7 @@
           <a:p>
             <a:fld id="{8FC04297-0A4E-4A07-84A0-4091E8BEFAFA}" type="datetimeFigureOut">
               <a:rPr lang="en-US" smtClean="0"/>
-              <a:t>6/27/2021</a:t>
+              <a:t>6/28/2021</a:t>
             </a:fld>
             <a:endParaRPr lang="en-US"/>
           </a:p>
@@ -470,7 +469,7 @@
           <a:p>
             <a:fld id="{8FC04297-0A4E-4A07-84A0-4091E8BEFAFA}" type="datetimeFigureOut">
               <a:rPr lang="en-US" smtClean="0"/>
-              <a:t>6/27/2021</a:t>
+              <a:t>6/28/2021</a:t>
             </a:fld>
             <a:endParaRPr lang="en-US"/>
           </a:p>
@@ -678,7 +677,7 @@
           <a:p>
             <a:fld id="{8FC04297-0A4E-4A07-84A0-4091E8BEFAFA}" type="datetimeFigureOut">
               <a:rPr lang="en-US" smtClean="0"/>
-              <a:t>6/27/2021</a:t>
+              <a:t>6/28/2021</a:t>
             </a:fld>
             <a:endParaRPr lang="en-US"/>
           </a:p>
@@ -876,7 +875,7 @@
           <a:p>
             <a:fld id="{8FC04297-0A4E-4A07-84A0-4091E8BEFAFA}" type="datetimeFigureOut">
               <a:rPr lang="en-US" smtClean="0"/>
-              <a:t>6/27/2021</a:t>
+              <a:t>6/28/2021</a:t>
             </a:fld>
             <a:endParaRPr lang="en-US"/>
           </a:p>
@@ -1151,7 +1150,7 @@
           <a:p>
             <a:fld id="{8FC04297-0A4E-4A07-84A0-4091E8BEFAFA}" type="datetimeFigureOut">
               <a:rPr lang="en-US" smtClean="0"/>
-              <a:t>6/27/2021</a:t>
+              <a:t>6/28/2021</a:t>
             </a:fld>
             <a:endParaRPr lang="en-US"/>
           </a:p>
@@ -1416,7 +1415,7 @@
           <a:p>
             <a:fld id="{8FC04297-0A4E-4A07-84A0-4091E8BEFAFA}" type="datetimeFigureOut">
               <a:rPr lang="en-US" smtClean="0"/>
-              <a:t>6/27/2021</a:t>
+              <a:t>6/28/2021</a:t>
             </a:fld>
             <a:endParaRPr lang="en-US"/>
           </a:p>
@@ -1828,7 +1827,7 @@
           <a:p>
             <a:fld id="{8FC04297-0A4E-4A07-84A0-4091E8BEFAFA}" type="datetimeFigureOut">
               <a:rPr lang="en-US" smtClean="0"/>
-              <a:t>6/27/2021</a:t>
+              <a:t>6/28/2021</a:t>
             </a:fld>
             <a:endParaRPr lang="en-US"/>
           </a:p>
@@ -1969,7 +1968,7 @@
           <a:p>
             <a:fld id="{8FC04297-0A4E-4A07-84A0-4091E8BEFAFA}" type="datetimeFigureOut">
               <a:rPr lang="en-US" smtClean="0"/>
-              <a:t>6/27/2021</a:t>
+              <a:t>6/28/2021</a:t>
             </a:fld>
             <a:endParaRPr lang="en-US"/>
           </a:p>
@@ -2082,7 +2081,7 @@
           <a:p>
             <a:fld id="{8FC04297-0A4E-4A07-84A0-4091E8BEFAFA}" type="datetimeFigureOut">
               <a:rPr lang="en-US" smtClean="0"/>
-              <a:t>6/27/2021</a:t>
+              <a:t>6/28/2021</a:t>
             </a:fld>
             <a:endParaRPr lang="en-US"/>
           </a:p>
@@ -2393,7 +2392,7 @@
           <a:p>
             <a:fld id="{8FC04297-0A4E-4A07-84A0-4091E8BEFAFA}" type="datetimeFigureOut">
               <a:rPr lang="en-US" smtClean="0"/>
-              <a:t>6/27/2021</a:t>
+              <a:t>6/28/2021</a:t>
             </a:fld>
             <a:endParaRPr lang="en-US"/>
           </a:p>
@@ -2681,7 +2680,7 @@
           <a:p>
             <a:fld id="{8FC04297-0A4E-4A07-84A0-4091E8BEFAFA}" type="datetimeFigureOut">
               <a:rPr lang="en-US" smtClean="0"/>
-              <a:t>6/27/2021</a:t>
+              <a:t>6/28/2021</a:t>
             </a:fld>
             <a:endParaRPr lang="en-US"/>
           </a:p>
@@ -2943,7 +2942,7 @@
           <a:p>
             <a:fld id="{8FC04297-0A4E-4A07-84A0-4091E8BEFAFA}" type="datetimeFigureOut">
               <a:rPr lang="en-US" smtClean="0"/>
-              <a:t>6/27/2021</a:t>
+              <a:t>6/28/2021</a:t>
             </a:fld>
             <a:endParaRPr lang="en-US"/>
           </a:p>
@@ -3399,28 +3398,56 @@
         </p:spPr>
         <p:txBody>
           <a:bodyPr>
-            <a:normAutofit/>
+            <a:normAutofit fontScale="90000"/>
           </a:bodyPr>
           <a:lstStyle/>
           <a:p>
             <a:r>
-              <a:rPr lang="en-US" dirty="0">
+              <a:rPr lang="en-US" b="1" dirty="0">
+                <a:effectLst>
+                  <a:outerShdw blurRad="38100" dist="38100" dir="2700000" algn="tl">
+                    <a:srgbClr val="000000">
+                      <a:alpha val="43137"/>
+                    </a:srgbClr>
+                  </a:outerShdw>
+                </a:effectLst>
                 <a:latin typeface="+mn-lt"/>
               </a:rPr>
               <a:t>The Metropolitan Museum of Art:</a:t>
             </a:r>
             <a:br>
-              <a:rPr lang="en-US" dirty="0">
+              <a:rPr lang="en-US" b="1" dirty="0">
+                <a:effectLst>
+                  <a:outerShdw blurRad="38100" dist="38100" dir="2700000" algn="tl">
+                    <a:srgbClr val="000000">
+                      <a:alpha val="43137"/>
+                    </a:srgbClr>
+                  </a:outerShdw>
+                </a:effectLst>
                 <a:latin typeface="+mn-lt"/>
               </a:rPr>
             </a:br>
             <a:r>
-              <a:rPr lang="en-US" sz="4000" dirty="0">
+              <a:rPr lang="en-US" sz="4000" b="1" dirty="0">
+                <a:effectLst>
+                  <a:outerShdw blurRad="38100" dist="38100" dir="2700000" algn="tl">
+                    <a:srgbClr val="000000">
+                      <a:alpha val="43137"/>
+                    </a:srgbClr>
+                  </a:outerShdw>
+                </a:effectLst>
                 <a:latin typeface="+mn-lt"/>
               </a:rPr>
               <a:t>A Look Into the Collection </a:t>
             </a:r>
-            <a:endParaRPr lang="en-US" dirty="0">
+            <a:endParaRPr lang="en-US" b="1" dirty="0">
+              <a:effectLst>
+                <a:outerShdw blurRad="38100" dist="38100" dir="2700000" algn="tl">
+                  <a:srgbClr val="000000">
+                    <a:alpha val="43137"/>
+                  </a:srgbClr>
+                </a:outerShdw>
+              </a:effectLst>
               <a:latin typeface="+mn-lt"/>
             </a:endParaRPr>
           </a:p>
@@ -3456,19 +3483,47 @@
           <a:p>
             <a:r>
               <a:rPr lang="en-US" dirty="0"/>
-              <a:t> Reevaluation of Analysis conducted February 6, 2021</a:t>
-            </a:r>
-          </a:p>
-          <a:p>
-            <a:r>
-              <a:rPr lang="en-US" dirty="0"/>
+              <a:t> </a:t>
+            </a:r>
+            <a:r>
+              <a:rPr lang="en-US" b="1" dirty="0">
+                <a:effectLst>
+                  <a:outerShdw blurRad="38100" dist="38100" dir="2700000" algn="tl">
+                    <a:srgbClr val="000000">
+                      <a:alpha val="43137"/>
+                    </a:srgbClr>
+                  </a:outerShdw>
+                </a:effectLst>
+              </a:rPr>
+              <a:t>Reevaluation of Analysis conducted by</a:t>
+            </a:r>
+          </a:p>
+          <a:p>
+            <a:r>
+              <a:rPr lang="en-US" b="1" dirty="0">
+                <a:effectLst>
+                  <a:outerShdw blurRad="38100" dist="38100" dir="2700000" algn="tl">
+                    <a:srgbClr val="000000">
+                      <a:alpha val="43137"/>
+                    </a:srgbClr>
+                  </a:outerShdw>
+                </a:effectLst>
+              </a:rPr>
               <a:t>TJ Ossola and Bryce Wilkinson </a:t>
             </a:r>
           </a:p>
           <a:p>
             <a:r>
-              <a:rPr lang="en-US" dirty="0"/>
-              <a:t>https://github.com/MtSopris/TheMetTeamProject</a:t>
+              <a:rPr lang="en-US" b="1" dirty="0">
+                <a:effectLst>
+                  <a:outerShdw blurRad="38100" dist="38100" dir="2700000" algn="tl">
+                    <a:srgbClr val="000000">
+                      <a:alpha val="43137"/>
+                    </a:srgbClr>
+                  </a:outerShdw>
+                </a:effectLst>
+              </a:rPr>
+              <a:t>https://github.com/MtSopris/TheMetTeamProject (Original)</a:t>
             </a:r>
           </a:p>
         </p:txBody>
@@ -3536,17 +3591,51 @@
           <a:p>
             <a:r>
               <a:rPr lang="en-US" sz="4000" dirty="0"/>
-              <a:t>Select Countries: Japan Breakdown by Object Type</a:t>
+              <a:t>Select Countries: Iran Breakdown by Object Type</a:t>
+            </a:r>
+          </a:p>
+        </p:txBody>
+      </p:sp>
+      <p:sp>
+        <p:nvSpPr>
+          <p:cNvPr id="4" name="Text Placeholder 3">
+            <a:extLst>
+              <a:ext uri="{FF2B5EF4-FFF2-40B4-BE49-F238E27FC236}">
+                <a16:creationId xmlns:a16="http://schemas.microsoft.com/office/drawing/2014/main" id="{B465A47E-92B7-4892-BD97-A1CD22448CC4}"/>
+              </a:ext>
+            </a:extLst>
+          </p:cNvPr>
+          <p:cNvSpPr>
+            <a:spLocks noGrp="1"/>
+          </p:cNvSpPr>
+          <p:nvPr>
+            <p:ph type="body" sz="quarter" idx="3"/>
+          </p:nvPr>
+        </p:nvSpPr>
+        <p:spPr>
+          <a:xfrm>
+            <a:off x="6523513" y="1685926"/>
+            <a:ext cx="5183188" cy="438582"/>
+          </a:xfrm>
+        </p:spPr>
+        <p:txBody>
+          <a:bodyPr/>
+          <a:lstStyle/>
+          <a:p>
+            <a:pPr algn="ctr"/>
+            <a:r>
+              <a:rPr lang="en-US" dirty="0"/>
+              <a:t>Head of Pin</a:t>
             </a:r>
           </a:p>
         </p:txBody>
       </p:sp>
       <p:pic>
         <p:nvPicPr>
-          <p:cNvPr id="7" name="Content Placeholder 6">
-            <a:extLst>
-              <a:ext uri="{FF2B5EF4-FFF2-40B4-BE49-F238E27FC236}">
-                <a16:creationId xmlns:a16="http://schemas.microsoft.com/office/drawing/2014/main" id="{404C958D-46E2-4E55-95BD-3554D96E5E9B}"/>
+          <p:cNvPr id="15" name="Content Placeholder 14">
+            <a:extLst>
+              <a:ext uri="{FF2B5EF4-FFF2-40B4-BE49-F238E27FC236}">
+                <a16:creationId xmlns:a16="http://schemas.microsoft.com/office/drawing/2014/main" id="{F8F0A07A-9725-4E50-BE0B-7C66EE185493}"/>
               </a:ext>
             </a:extLst>
           </p:cNvPr>
@@ -3554,78 +3643,11 @@
             <a:picLocks noGrp="1" noChangeAspect="1"/>
           </p:cNvPicPr>
           <p:nvPr>
-            <p:ph sz="half" idx="2"/>
+            <p:ph sz="quarter" idx="4"/>
           </p:nvPr>
         </p:nvPicPr>
         <p:blipFill>
           <a:blip r:embed="rId2">
-            <a:extLst>
-              <a:ext uri="{28A0092B-C50C-407E-A947-70E740481C1C}">
-                <a14:useLocalDpi xmlns:a14="http://schemas.microsoft.com/office/drawing/2010/main" val="0"/>
-              </a:ext>
-            </a:extLst>
-          </a:blip>
-          <a:stretch/>
-        </p:blipFill>
-        <p:spPr>
-          <a:xfrm>
-            <a:off x="0" y="976602"/>
-            <a:ext cx="5881398" cy="5881398"/>
-          </a:xfrm>
-        </p:spPr>
-      </p:pic>
-      <p:sp>
-        <p:nvSpPr>
-          <p:cNvPr id="4" name="Text Placeholder 3">
-            <a:extLst>
-              <a:ext uri="{FF2B5EF4-FFF2-40B4-BE49-F238E27FC236}">
-                <a16:creationId xmlns:a16="http://schemas.microsoft.com/office/drawing/2014/main" id="{B465A47E-92B7-4892-BD97-A1CD22448CC4}"/>
-              </a:ext>
-            </a:extLst>
-          </p:cNvPr>
-          <p:cNvSpPr>
-            <a:spLocks noGrp="1"/>
-          </p:cNvSpPr>
-          <p:nvPr>
-            <p:ph type="body" sz="quarter" idx="3"/>
-          </p:nvPr>
-        </p:nvSpPr>
-        <p:spPr>
-          <a:xfrm>
-            <a:off x="6172200" y="1681163"/>
-            <a:ext cx="5183188" cy="438582"/>
-          </a:xfrm>
-        </p:spPr>
-        <p:txBody>
-          <a:bodyPr/>
-          <a:lstStyle/>
-          <a:p>
-            <a:pPr algn="ctr"/>
-            <a:r>
-              <a:rPr lang="en-US" dirty="0"/>
-              <a:t>Japanese Drum</a:t>
-            </a:r>
-          </a:p>
-        </p:txBody>
-      </p:sp>
-      <p:pic>
-        <p:nvPicPr>
-          <p:cNvPr id="8" name="Content Placeholder 7">
-            <a:extLst>
-              <a:ext uri="{FF2B5EF4-FFF2-40B4-BE49-F238E27FC236}">
-                <a16:creationId xmlns:a16="http://schemas.microsoft.com/office/drawing/2014/main" id="{DC0646DF-C902-4F52-BAC2-0A9B13F4F349}"/>
-              </a:ext>
-            </a:extLst>
-          </p:cNvPr>
-          <p:cNvPicPr>
-            <a:picLocks noGrp="1" noChangeAspect="1"/>
-          </p:cNvPicPr>
-          <p:nvPr>
-            <p:ph sz="quarter" idx="4"/>
-          </p:nvPr>
-        </p:nvPicPr>
-        <p:blipFill>
-          <a:blip r:embed="rId3">
             <a:extLst>
               <a:ext uri="{28A0092B-C50C-407E-A947-70E740481C1C}">
                 <a14:useLocalDpi xmlns:a14="http://schemas.microsoft.com/office/drawing/2010/main" val="0"/>
@@ -3638,12 +3660,46 @@
         </p:blipFill>
         <p:spPr>
           <a:xfrm>
-            <a:off x="7289959" y="2119745"/>
-            <a:ext cx="2947670" cy="3684588"/>
+            <a:off x="7824787" y="2119745"/>
+            <a:ext cx="2580640" cy="4387088"/>
           </a:xfrm>
           <a:effectLst>
-            <a:softEdge rad="177800"/>
+            <a:softEdge rad="127000"/>
           </a:effectLst>
+        </p:spPr>
+      </p:pic>
+      <p:pic>
+        <p:nvPicPr>
+          <p:cNvPr id="19" name="Content Placeholder 18">
+            <a:extLst>
+              <a:ext uri="{FF2B5EF4-FFF2-40B4-BE49-F238E27FC236}">
+                <a16:creationId xmlns:a16="http://schemas.microsoft.com/office/drawing/2014/main" id="{D1F98376-8191-4DA1-91A1-EE9B84755820}"/>
+              </a:ext>
+            </a:extLst>
+          </p:cNvPr>
+          <p:cNvPicPr>
+            <a:picLocks noGrp="1" noChangeAspect="1"/>
+          </p:cNvPicPr>
+          <p:nvPr>
+            <p:ph sz="half" idx="2"/>
+          </p:nvPr>
+        </p:nvPicPr>
+        <p:blipFill rotWithShape="1">
+          <a:blip r:embed="rId3">
+            <a:extLst>
+              <a:ext uri="{28A0092B-C50C-407E-A947-70E740481C1C}">
+                <a14:useLocalDpi xmlns:a14="http://schemas.microsoft.com/office/drawing/2010/main" val="0"/>
+              </a:ext>
+            </a:extLst>
+          </a:blip>
+          <a:srcRect t="7636" b="12476"/>
+          <a:stretch/>
+        </p:blipFill>
+        <p:spPr>
+          <a:xfrm>
+            <a:off x="981392" y="1564007"/>
+            <a:ext cx="5978207" cy="4775834"/>
+          </a:xfrm>
         </p:spPr>
       </p:pic>
     </p:spTree>
@@ -3660,550 +3716,6 @@
 </file>
 
 <file path=ppt/slides/slide11.xml><?xml version="1.0" encoding="utf-8"?>
-<p:sld xmlns:a="http://schemas.openxmlformats.org/drawingml/2006/main" xmlns:r="http://schemas.openxmlformats.org/officeDocument/2006/relationships" xmlns:p="http://schemas.openxmlformats.org/presentationml/2006/main">
-  <p:cSld>
-    <p:bg>
-      <p:bgPr>
-        <a:solidFill>
-          <a:schemeClr val="bg1"/>
-        </a:solidFill>
-        <a:effectLst/>
-      </p:bgPr>
-    </p:bg>
-    <p:spTree>
-      <p:nvGrpSpPr>
-        <p:cNvPr id="1" name=""/>
-        <p:cNvGrpSpPr/>
-        <p:nvPr/>
-      </p:nvGrpSpPr>
-      <p:grpSpPr>
-        <a:xfrm>
-          <a:off x="0" y="0"/>
-          <a:ext cx="0" cy="0"/>
-          <a:chOff x="0" y="0"/>
-          <a:chExt cx="0" cy="0"/>
-        </a:xfrm>
-      </p:grpSpPr>
-      <p:sp>
-        <p:nvSpPr>
-          <p:cNvPr id="2" name="Title 1">
-            <a:extLst>
-              <a:ext uri="{FF2B5EF4-FFF2-40B4-BE49-F238E27FC236}">
-                <a16:creationId xmlns:a16="http://schemas.microsoft.com/office/drawing/2014/main" id="{555D1F26-F171-4F89-9348-D8380221C40B}"/>
-              </a:ext>
-            </a:extLst>
-          </p:cNvPr>
-          <p:cNvSpPr>
-            <a:spLocks noGrp="1"/>
-          </p:cNvSpPr>
-          <p:nvPr>
-            <p:ph type="title"/>
-          </p:nvPr>
-        </p:nvSpPr>
-        <p:spPr/>
-        <p:txBody>
-          <a:bodyPr>
-            <a:normAutofit/>
-          </a:bodyPr>
-          <a:lstStyle/>
-          <a:p>
-            <a:r>
-              <a:rPr lang="en-US" sz="3600" dirty="0"/>
-              <a:t>Select Countries: Nigeria Breakdown by Object Type</a:t>
-            </a:r>
-          </a:p>
-        </p:txBody>
-      </p:sp>
-      <p:pic>
-        <p:nvPicPr>
-          <p:cNvPr id="7" name="Content Placeholder 6">
-            <a:extLst>
-              <a:ext uri="{FF2B5EF4-FFF2-40B4-BE49-F238E27FC236}">
-                <a16:creationId xmlns:a16="http://schemas.microsoft.com/office/drawing/2014/main" id="{404C958D-46E2-4E55-95BD-3554D96E5E9B}"/>
-              </a:ext>
-            </a:extLst>
-          </p:cNvPr>
-          <p:cNvPicPr>
-            <a:picLocks noGrp="1" noChangeAspect="1"/>
-          </p:cNvPicPr>
-          <p:nvPr>
-            <p:ph sz="half" idx="1"/>
-          </p:nvPr>
-        </p:nvPicPr>
-        <p:blipFill>
-          <a:blip r:embed="rId2">
-            <a:extLst>
-              <a:ext uri="{28A0092B-C50C-407E-A947-70E740481C1C}">
-                <a14:useLocalDpi xmlns:a14="http://schemas.microsoft.com/office/drawing/2010/main" val="0"/>
-              </a:ext>
-            </a:extLst>
-          </a:blip>
-          <a:stretch/>
-        </p:blipFill>
-        <p:spPr>
-          <a:xfrm>
-            <a:off x="0" y="1389186"/>
-            <a:ext cx="5569526" cy="5468814"/>
-          </a:xfrm>
-        </p:spPr>
-      </p:pic>
-      <p:pic>
-        <p:nvPicPr>
-          <p:cNvPr id="6" name="Content Placeholder 5">
-            <a:extLst>
-              <a:ext uri="{FF2B5EF4-FFF2-40B4-BE49-F238E27FC236}">
-                <a16:creationId xmlns:a16="http://schemas.microsoft.com/office/drawing/2014/main" id="{AFC1406E-B35D-430D-993D-641340249D50}"/>
-              </a:ext>
-            </a:extLst>
-          </p:cNvPr>
-          <p:cNvPicPr>
-            <a:picLocks noGrp="1" noChangeAspect="1"/>
-          </p:cNvPicPr>
-          <p:nvPr>
-            <p:ph sz="half" idx="2"/>
-          </p:nvPr>
-        </p:nvPicPr>
-        <p:blipFill>
-          <a:blip r:embed="rId3">
-            <a:extLst>
-              <a:ext uri="{28A0092B-C50C-407E-A947-70E740481C1C}">
-                <a14:useLocalDpi xmlns:a14="http://schemas.microsoft.com/office/drawing/2010/main" val="0"/>
-              </a:ext>
-            </a:extLst>
-          </a:blip>
-          <a:stretch>
-            <a:fillRect/>
-          </a:stretch>
-        </p:blipFill>
-        <p:spPr>
-          <a:xfrm>
-            <a:off x="7013865" y="1878653"/>
-            <a:ext cx="3498270" cy="4716770"/>
-          </a:xfrm>
-          <a:effectLst>
-            <a:softEdge rad="279400"/>
-          </a:effectLst>
-        </p:spPr>
-      </p:pic>
-      <p:sp>
-        <p:nvSpPr>
-          <p:cNvPr id="5" name="Text Placeholder 3">
-            <a:extLst>
-              <a:ext uri="{FF2B5EF4-FFF2-40B4-BE49-F238E27FC236}">
-                <a16:creationId xmlns:a16="http://schemas.microsoft.com/office/drawing/2014/main" id="{43C4324A-4435-452F-9B1C-50A0C511F3AE}"/>
-              </a:ext>
-            </a:extLst>
-          </p:cNvPr>
-          <p:cNvSpPr txBox="1">
-            <a:spLocks/>
-          </p:cNvSpPr>
-          <p:nvPr/>
-        </p:nvSpPr>
-        <p:spPr>
-          <a:xfrm>
-            <a:off x="6096000" y="1389186"/>
-            <a:ext cx="5183188" cy="438582"/>
-          </a:xfrm>
-          <a:prstGeom prst="rect">
-            <a:avLst/>
-          </a:prstGeom>
-        </p:spPr>
-        <p:txBody>
-          <a:bodyPr/>
-          <a:lstStyle>
-            <a:lvl1pPr marL="228600" indent="-228600" algn="l" defTabSz="914400" rtl="0" eaLnBrk="1" latinLnBrk="0" hangingPunct="1">
-              <a:lnSpc>
-                <a:spcPct val="90000"/>
-              </a:lnSpc>
-              <a:spcBef>
-                <a:spcPts val="1000"/>
-              </a:spcBef>
-              <a:buFont typeface="Arial" panose="020B0604020202020204" pitchFamily="34" charset="0"/>
-              <a:buChar char="•"/>
-              <a:defRPr sz="2800" kern="1200">
-                <a:solidFill>
-                  <a:schemeClr val="tx1"/>
-                </a:solidFill>
-                <a:latin typeface="+mn-lt"/>
-                <a:ea typeface="+mn-ea"/>
-                <a:cs typeface="+mn-cs"/>
-              </a:defRPr>
-            </a:lvl1pPr>
-            <a:lvl2pPr marL="685800" indent="-228600" algn="l" defTabSz="914400" rtl="0" eaLnBrk="1" latinLnBrk="0" hangingPunct="1">
-              <a:lnSpc>
-                <a:spcPct val="90000"/>
-              </a:lnSpc>
-              <a:spcBef>
-                <a:spcPts val="500"/>
-              </a:spcBef>
-              <a:buFont typeface="Arial" panose="020B0604020202020204" pitchFamily="34" charset="0"/>
-              <a:buChar char="•"/>
-              <a:defRPr sz="2400" kern="1200">
-                <a:solidFill>
-                  <a:schemeClr val="tx1"/>
-                </a:solidFill>
-                <a:latin typeface="+mn-lt"/>
-                <a:ea typeface="+mn-ea"/>
-                <a:cs typeface="+mn-cs"/>
-              </a:defRPr>
-            </a:lvl2pPr>
-            <a:lvl3pPr marL="1143000" indent="-228600" algn="l" defTabSz="914400" rtl="0" eaLnBrk="1" latinLnBrk="0" hangingPunct="1">
-              <a:lnSpc>
-                <a:spcPct val="90000"/>
-              </a:lnSpc>
-              <a:spcBef>
-                <a:spcPts val="500"/>
-              </a:spcBef>
-              <a:buFont typeface="Arial" panose="020B0604020202020204" pitchFamily="34" charset="0"/>
-              <a:buChar char="•"/>
-              <a:defRPr sz="2000" kern="1200">
-                <a:solidFill>
-                  <a:schemeClr val="tx1"/>
-                </a:solidFill>
-                <a:latin typeface="+mn-lt"/>
-                <a:ea typeface="+mn-ea"/>
-                <a:cs typeface="+mn-cs"/>
-              </a:defRPr>
-            </a:lvl3pPr>
-            <a:lvl4pPr marL="1600200" indent="-228600" algn="l" defTabSz="914400" rtl="0" eaLnBrk="1" latinLnBrk="0" hangingPunct="1">
-              <a:lnSpc>
-                <a:spcPct val="90000"/>
-              </a:lnSpc>
-              <a:spcBef>
-                <a:spcPts val="500"/>
-              </a:spcBef>
-              <a:buFont typeface="Arial" panose="020B0604020202020204" pitchFamily="34" charset="0"/>
-              <a:buChar char="•"/>
-              <a:defRPr sz="1800" kern="1200">
-                <a:solidFill>
-                  <a:schemeClr val="tx1"/>
-                </a:solidFill>
-                <a:latin typeface="+mn-lt"/>
-                <a:ea typeface="+mn-ea"/>
-                <a:cs typeface="+mn-cs"/>
-              </a:defRPr>
-            </a:lvl4pPr>
-            <a:lvl5pPr marL="2057400" indent="-228600" algn="l" defTabSz="914400" rtl="0" eaLnBrk="1" latinLnBrk="0" hangingPunct="1">
-              <a:lnSpc>
-                <a:spcPct val="90000"/>
-              </a:lnSpc>
-              <a:spcBef>
-                <a:spcPts val="500"/>
-              </a:spcBef>
-              <a:buFont typeface="Arial" panose="020B0604020202020204" pitchFamily="34" charset="0"/>
-              <a:buChar char="•"/>
-              <a:defRPr sz="1800" kern="1200">
-                <a:solidFill>
-                  <a:schemeClr val="tx1"/>
-                </a:solidFill>
-                <a:latin typeface="+mn-lt"/>
-                <a:ea typeface="+mn-ea"/>
-                <a:cs typeface="+mn-cs"/>
-              </a:defRPr>
-            </a:lvl5pPr>
-            <a:lvl6pPr marL="2514600" indent="-228600" algn="l" defTabSz="914400" rtl="0" eaLnBrk="1" latinLnBrk="0" hangingPunct="1">
-              <a:lnSpc>
-                <a:spcPct val="90000"/>
-              </a:lnSpc>
-              <a:spcBef>
-                <a:spcPts val="500"/>
-              </a:spcBef>
-              <a:buFont typeface="Arial" panose="020B0604020202020204" pitchFamily="34" charset="0"/>
-              <a:buChar char="•"/>
-              <a:defRPr sz="1800" kern="1200">
-                <a:solidFill>
-                  <a:schemeClr val="tx1"/>
-                </a:solidFill>
-                <a:latin typeface="+mn-lt"/>
-                <a:ea typeface="+mn-ea"/>
-                <a:cs typeface="+mn-cs"/>
-              </a:defRPr>
-            </a:lvl6pPr>
-            <a:lvl7pPr marL="2971800" indent="-228600" algn="l" defTabSz="914400" rtl="0" eaLnBrk="1" latinLnBrk="0" hangingPunct="1">
-              <a:lnSpc>
-                <a:spcPct val="90000"/>
-              </a:lnSpc>
-              <a:spcBef>
-                <a:spcPts val="500"/>
-              </a:spcBef>
-              <a:buFont typeface="Arial" panose="020B0604020202020204" pitchFamily="34" charset="0"/>
-              <a:buChar char="•"/>
-              <a:defRPr sz="1800" kern="1200">
-                <a:solidFill>
-                  <a:schemeClr val="tx1"/>
-                </a:solidFill>
-                <a:latin typeface="+mn-lt"/>
-                <a:ea typeface="+mn-ea"/>
-                <a:cs typeface="+mn-cs"/>
-              </a:defRPr>
-            </a:lvl7pPr>
-            <a:lvl8pPr marL="3429000" indent="-228600" algn="l" defTabSz="914400" rtl="0" eaLnBrk="1" latinLnBrk="0" hangingPunct="1">
-              <a:lnSpc>
-                <a:spcPct val="90000"/>
-              </a:lnSpc>
-              <a:spcBef>
-                <a:spcPts val="500"/>
-              </a:spcBef>
-              <a:buFont typeface="Arial" panose="020B0604020202020204" pitchFamily="34" charset="0"/>
-              <a:buChar char="•"/>
-              <a:defRPr sz="1800" kern="1200">
-                <a:solidFill>
-                  <a:schemeClr val="tx1"/>
-                </a:solidFill>
-                <a:latin typeface="+mn-lt"/>
-                <a:ea typeface="+mn-ea"/>
-                <a:cs typeface="+mn-cs"/>
-              </a:defRPr>
-            </a:lvl8pPr>
-            <a:lvl9pPr marL="3886200" indent="-228600" algn="l" defTabSz="914400" rtl="0" eaLnBrk="1" latinLnBrk="0" hangingPunct="1">
-              <a:lnSpc>
-                <a:spcPct val="90000"/>
-              </a:lnSpc>
-              <a:spcBef>
-                <a:spcPts val="500"/>
-              </a:spcBef>
-              <a:buFont typeface="Arial" panose="020B0604020202020204" pitchFamily="34" charset="0"/>
-              <a:buChar char="•"/>
-              <a:defRPr sz="1800" kern="1200">
-                <a:solidFill>
-                  <a:schemeClr val="tx1"/>
-                </a:solidFill>
-                <a:latin typeface="+mn-lt"/>
-                <a:ea typeface="+mn-ea"/>
-                <a:cs typeface="+mn-cs"/>
-              </a:defRPr>
-            </a:lvl9pPr>
-          </a:lstStyle>
-          <a:p>
-            <a:pPr marL="0" indent="0" algn="ctr">
-              <a:buNone/>
-            </a:pPr>
-            <a:r>
-              <a:rPr lang="en-US" dirty="0"/>
-              <a:t>Nigerian Mask </a:t>
-            </a:r>
-          </a:p>
-        </p:txBody>
-      </p:sp>
-    </p:spTree>
-    <p:extLst>
-      <p:ext uri="{BB962C8B-B14F-4D97-AF65-F5344CB8AC3E}">
-        <p14:creationId xmlns:p14="http://schemas.microsoft.com/office/powerpoint/2010/main" val="1207957710"/>
-      </p:ext>
-    </p:extLst>
-  </p:cSld>
-  <p:clrMapOvr>
-    <a:masterClrMapping/>
-  </p:clrMapOvr>
-</p:sld>
-</file>
-
-<file path=ppt/slides/slide12.xml><?xml version="1.0" encoding="utf-8"?>
-<p:sld xmlns:a="http://schemas.openxmlformats.org/drawingml/2006/main" xmlns:r="http://schemas.openxmlformats.org/officeDocument/2006/relationships" xmlns:p="http://schemas.openxmlformats.org/presentationml/2006/main">
-  <p:cSld>
-    <p:bg>
-      <p:bgPr>
-        <a:solidFill>
-          <a:schemeClr val="bg1"/>
-        </a:solidFill>
-        <a:effectLst/>
-      </p:bgPr>
-    </p:bg>
-    <p:spTree>
-      <p:nvGrpSpPr>
-        <p:cNvPr id="1" name=""/>
-        <p:cNvGrpSpPr/>
-        <p:nvPr/>
-      </p:nvGrpSpPr>
-      <p:grpSpPr>
-        <a:xfrm>
-          <a:off x="0" y="0"/>
-          <a:ext cx="0" cy="0"/>
-          <a:chOff x="0" y="0"/>
-          <a:chExt cx="0" cy="0"/>
-        </a:xfrm>
-      </p:grpSpPr>
-      <p:sp>
-        <p:nvSpPr>
-          <p:cNvPr id="2" name="Title 1">
-            <a:extLst>
-              <a:ext uri="{FF2B5EF4-FFF2-40B4-BE49-F238E27FC236}">
-                <a16:creationId xmlns:a16="http://schemas.microsoft.com/office/drawing/2014/main" id="{555D1F26-F171-4F89-9348-D8380221C40B}"/>
-              </a:ext>
-            </a:extLst>
-          </p:cNvPr>
-          <p:cNvSpPr>
-            <a:spLocks noGrp="1"/>
-          </p:cNvSpPr>
-          <p:nvPr>
-            <p:ph type="title"/>
-          </p:nvPr>
-        </p:nvSpPr>
-        <p:spPr/>
-        <p:txBody>
-          <a:bodyPr>
-            <a:normAutofit/>
-          </a:bodyPr>
-          <a:lstStyle/>
-          <a:p>
-            <a:r>
-              <a:rPr lang="en-US" sz="3600" dirty="0"/>
-              <a:t>Select Countries: Germany Breakdown by Object Type</a:t>
-            </a:r>
-          </a:p>
-        </p:txBody>
-      </p:sp>
-      <p:pic>
-        <p:nvPicPr>
-          <p:cNvPr id="7" name="Content Placeholder 6">
-            <a:extLst>
-              <a:ext uri="{FF2B5EF4-FFF2-40B4-BE49-F238E27FC236}">
-                <a16:creationId xmlns:a16="http://schemas.microsoft.com/office/drawing/2014/main" id="{404C958D-46E2-4E55-95BD-3554D96E5E9B}"/>
-              </a:ext>
-            </a:extLst>
-          </p:cNvPr>
-          <p:cNvPicPr>
-            <a:picLocks noGrp="1" noChangeAspect="1"/>
-          </p:cNvPicPr>
-          <p:nvPr>
-            <p:ph sz="half" idx="2"/>
-          </p:nvPr>
-        </p:nvPicPr>
-        <p:blipFill>
-          <a:blip r:embed="rId2">
-            <a:extLst>
-              <a:ext uri="{28A0092B-C50C-407E-A947-70E740481C1C}">
-                <a14:useLocalDpi xmlns:a14="http://schemas.microsoft.com/office/drawing/2010/main" val="0"/>
-              </a:ext>
-            </a:extLst>
-          </a:blip>
-          <a:stretch/>
-        </p:blipFill>
-        <p:spPr>
-          <a:xfrm>
-            <a:off x="0" y="1163638"/>
-            <a:ext cx="5694362" cy="5694362"/>
-          </a:xfrm>
-        </p:spPr>
-      </p:pic>
-      <p:sp>
-        <p:nvSpPr>
-          <p:cNvPr id="5" name="Text Placeholder 4">
-            <a:extLst>
-              <a:ext uri="{FF2B5EF4-FFF2-40B4-BE49-F238E27FC236}">
-                <a16:creationId xmlns:a16="http://schemas.microsoft.com/office/drawing/2014/main" id="{6F9AF045-BEF1-43F0-928D-4CD85789195C}"/>
-              </a:ext>
-            </a:extLst>
-          </p:cNvPr>
-          <p:cNvSpPr>
-            <a:spLocks noGrp="1"/>
-          </p:cNvSpPr>
-          <p:nvPr>
-            <p:ph type="body" sz="quarter" idx="3"/>
-          </p:nvPr>
-        </p:nvSpPr>
-        <p:spPr>
-          <a:xfrm>
-            <a:off x="6172200" y="1681163"/>
-            <a:ext cx="5183188" cy="511319"/>
-          </a:xfrm>
-        </p:spPr>
-        <p:txBody>
-          <a:bodyPr/>
-          <a:lstStyle/>
-          <a:p>
-            <a:pPr algn="ctr"/>
-            <a:r>
-              <a:rPr lang="en-US" dirty="0"/>
-              <a:t>German Metalwork &amp; Glass</a:t>
-            </a:r>
-          </a:p>
-        </p:txBody>
-      </p:sp>
-      <p:pic>
-        <p:nvPicPr>
-          <p:cNvPr id="10" name="Content Placeholder 9">
-            <a:extLst>
-              <a:ext uri="{FF2B5EF4-FFF2-40B4-BE49-F238E27FC236}">
-                <a16:creationId xmlns:a16="http://schemas.microsoft.com/office/drawing/2014/main" id="{EA0FABC9-2326-4F59-B63D-FE9164E4A201}"/>
-              </a:ext>
-            </a:extLst>
-          </p:cNvPr>
-          <p:cNvPicPr>
-            <a:picLocks noGrp="1" noChangeAspect="1"/>
-          </p:cNvPicPr>
-          <p:nvPr>
-            <p:ph sz="quarter" idx="4"/>
-          </p:nvPr>
-        </p:nvPicPr>
-        <p:blipFill>
-          <a:blip r:embed="rId3">
-            <a:extLst>
-              <a:ext uri="{28A0092B-C50C-407E-A947-70E740481C1C}">
-                <a14:useLocalDpi xmlns:a14="http://schemas.microsoft.com/office/drawing/2010/main" val="0"/>
-              </a:ext>
-            </a:extLst>
-          </a:blip>
-          <a:srcRect/>
-          <a:stretch/>
-        </p:blipFill>
-        <p:spPr>
-          <a:xfrm>
-            <a:off x="9112958" y="2348389"/>
-            <a:ext cx="2242430" cy="3587886"/>
-          </a:xfrm>
-          <a:effectLst>
-            <a:softEdge rad="203200"/>
-          </a:effectLst>
-        </p:spPr>
-      </p:pic>
-      <p:pic>
-        <p:nvPicPr>
-          <p:cNvPr id="11" name="Picture 10">
-            <a:extLst>
-              <a:ext uri="{FF2B5EF4-FFF2-40B4-BE49-F238E27FC236}">
-                <a16:creationId xmlns:a16="http://schemas.microsoft.com/office/drawing/2014/main" id="{D8FC071A-9324-4C90-A94C-09EB1399F319}"/>
-              </a:ext>
-            </a:extLst>
-          </p:cNvPr>
-          <p:cNvPicPr>
-            <a:picLocks noChangeAspect="1"/>
-          </p:cNvPicPr>
-          <p:nvPr/>
-        </p:nvPicPr>
-        <p:blipFill>
-          <a:blip r:embed="rId4"/>
-          <a:stretch>
-            <a:fillRect/>
-          </a:stretch>
-        </p:blipFill>
-        <p:spPr>
-          <a:xfrm>
-            <a:off x="5850081" y="2393560"/>
-            <a:ext cx="2995968" cy="3003364"/>
-          </a:xfrm>
-          <a:prstGeom prst="rect">
-            <a:avLst/>
-          </a:prstGeom>
-          <a:effectLst>
-            <a:softEdge rad="165100"/>
-          </a:effectLst>
-        </p:spPr>
-      </p:pic>
-    </p:spTree>
-    <p:extLst>
-      <p:ext uri="{BB962C8B-B14F-4D97-AF65-F5344CB8AC3E}">
-        <p14:creationId xmlns:p14="http://schemas.microsoft.com/office/powerpoint/2010/main" val="1719819917"/>
-      </p:ext>
-    </p:extLst>
-  </p:cSld>
-  <p:clrMapOvr>
-    <a:masterClrMapping/>
-  </p:clrMapOvr>
-</p:sld>
-</file>
-
-<file path=ppt/slides/slide13.xml><?xml version="1.0" encoding="utf-8"?>
 <p:sld xmlns:a="http://schemas.openxmlformats.org/drawingml/2006/main" xmlns:r="http://schemas.openxmlformats.org/officeDocument/2006/relationships" xmlns:p="http://schemas.openxmlformats.org/presentationml/2006/main">
   <p:cSld>
     <p:bg>
@@ -4235,12 +3747,53 @@
           <a:chExt cx="0" cy="0"/>
         </a:xfrm>
       </p:grpSpPr>
+      <p:sp>
+        <p:nvSpPr>
+          <p:cNvPr id="2" name="Title 1">
+            <a:extLst>
+              <a:ext uri="{FF2B5EF4-FFF2-40B4-BE49-F238E27FC236}">
+                <a16:creationId xmlns:a16="http://schemas.microsoft.com/office/drawing/2014/main" id="{555D1F26-F171-4F89-9348-D8380221C40B}"/>
+              </a:ext>
+            </a:extLst>
+          </p:cNvPr>
+          <p:cNvSpPr>
+            <a:spLocks noGrp="1"/>
+          </p:cNvSpPr>
+          <p:nvPr>
+            <p:ph type="title"/>
+          </p:nvPr>
+        </p:nvSpPr>
+        <p:spPr>
+          <a:xfrm>
+            <a:off x="2540000" y="0"/>
+            <a:ext cx="8773160" cy="1325563"/>
+          </a:xfrm>
+        </p:spPr>
+        <p:txBody>
+          <a:bodyPr/>
+          <a:lstStyle/>
+          <a:p>
+            <a:r>
+              <a:rPr lang="en-US" b="1" dirty="0">
+                <a:effectLst>
+                  <a:outerShdw blurRad="38100" dist="38100" dir="2700000" algn="tl">
+                    <a:srgbClr val="000000">
+                      <a:alpha val="43137"/>
+                    </a:srgbClr>
+                  </a:outerShdw>
+                </a:effectLst>
+              </a:rPr>
+              <a:t>Patrons donating 1000 - 4000 Objects</a:t>
+            </a:r>
+          </a:p>
+        </p:txBody>
+      </p:sp>
       <p:pic>
         <p:nvPicPr>
-          <p:cNvPr id="15" name="Content Placeholder 14">
-            <a:extLst>
-              <a:ext uri="{FF2B5EF4-FFF2-40B4-BE49-F238E27FC236}">
-                <a16:creationId xmlns:a16="http://schemas.microsoft.com/office/drawing/2014/main" id="{1CF8115E-1CF7-47E5-9BB3-9BD03ADC0B9C}"/>
+          <p:cNvPr id="10" name="Content Placeholder 9">
+            <a:extLst>
+              <a:ext uri="{FF2B5EF4-FFF2-40B4-BE49-F238E27FC236}">
+                <a16:creationId xmlns:a16="http://schemas.microsoft.com/office/drawing/2014/main" id="{035DEBCB-D952-4CD3-9091-1803303166F5}"/>
               </a:ext>
             </a:extLst>
           </p:cNvPr>
@@ -4265,50 +3818,19 @@
         </p:blipFill>
         <p:spPr>
           <a:xfrm>
-            <a:off x="5426408" y="1520190"/>
-            <a:ext cx="6765592" cy="4276364"/>
+            <a:off x="5902954" y="1325563"/>
+            <a:ext cx="5486411" cy="3657607"/>
           </a:xfrm>
           <a:effectLst>
-            <a:outerShdw blurRad="50800" dist="50800" dir="5400000" algn="ctr" rotWithShape="0">
-              <a:srgbClr val="000000"/>
-            </a:outerShdw>
-            <a:reflection stA="0" endPos="65000" dist="50800" dir="5400000" sy="-100000" algn="bl" rotWithShape="0"/>
+            <a:glow rad="63500">
+              <a:schemeClr val="accent2">
+                <a:satMod val="175000"/>
+                <a:alpha val="40000"/>
+              </a:schemeClr>
+            </a:glow>
           </a:effectLst>
         </p:spPr>
       </p:pic>
-      <p:sp>
-        <p:nvSpPr>
-          <p:cNvPr id="2" name="Title 1">
-            <a:extLst>
-              <a:ext uri="{FF2B5EF4-FFF2-40B4-BE49-F238E27FC236}">
-                <a16:creationId xmlns:a16="http://schemas.microsoft.com/office/drawing/2014/main" id="{555D1F26-F171-4F89-9348-D8380221C40B}"/>
-              </a:ext>
-            </a:extLst>
-          </p:cNvPr>
-          <p:cNvSpPr>
-            <a:spLocks noGrp="1"/>
-          </p:cNvSpPr>
-          <p:nvPr>
-            <p:ph type="title"/>
-          </p:nvPr>
-        </p:nvSpPr>
-        <p:spPr>
-          <a:xfrm>
-            <a:off x="7212330" y="365125"/>
-            <a:ext cx="4141470" cy="1325563"/>
-          </a:xfrm>
-        </p:spPr>
-        <p:txBody>
-          <a:bodyPr/>
-          <a:lstStyle/>
-          <a:p>
-            <a:r>
-              <a:rPr lang="en-US" b="1" dirty="0"/>
-              <a:t>Top Ten Patrons</a:t>
-            </a:r>
-          </a:p>
-        </p:txBody>
-      </p:sp>
     </p:spTree>
     <p:extLst>
       <p:ext uri="{BB962C8B-B14F-4D97-AF65-F5344CB8AC3E}">
@@ -4322,7 +3844,306 @@
 </p:sld>
 </file>
 
-<file path=ppt/slides/slide14.xml><?xml version="1.0" encoding="utf-8"?>
+<file path=ppt/slides/slide12.xml><?xml version="1.0" encoding="utf-8"?>
+<p:sld xmlns:a="http://schemas.openxmlformats.org/drawingml/2006/main" xmlns:r="http://schemas.openxmlformats.org/officeDocument/2006/relationships" xmlns:p="http://schemas.openxmlformats.org/presentationml/2006/main">
+  <p:cSld>
+    <p:bg>
+      <p:bgPr>
+        <a:blipFill dpi="0" rotWithShape="1">
+          <a:blip r:embed="rId2">
+            <a:alphaModFix amt="35000"/>
+            <a:lum/>
+          </a:blip>
+          <a:srcRect/>
+          <a:stretch>
+            <a:fillRect t="-3000" b="-3000"/>
+          </a:stretch>
+        </a:blipFill>
+        <a:effectLst/>
+      </p:bgPr>
+    </p:bg>
+    <p:spTree>
+      <p:nvGrpSpPr>
+        <p:cNvPr id="1" name=""/>
+        <p:cNvGrpSpPr/>
+        <p:nvPr/>
+      </p:nvGrpSpPr>
+      <p:grpSpPr>
+        <a:xfrm>
+          <a:off x="0" y="0"/>
+          <a:ext cx="0" cy="0"/>
+          <a:chOff x="0" y="0"/>
+          <a:chExt cx="0" cy="0"/>
+        </a:xfrm>
+      </p:grpSpPr>
+      <p:sp>
+        <p:nvSpPr>
+          <p:cNvPr id="2" name="Title 1">
+            <a:extLst>
+              <a:ext uri="{FF2B5EF4-FFF2-40B4-BE49-F238E27FC236}">
+                <a16:creationId xmlns:a16="http://schemas.microsoft.com/office/drawing/2014/main" id="{CB505507-BD74-45E2-A038-FCA62956F606}"/>
+              </a:ext>
+            </a:extLst>
+          </p:cNvPr>
+          <p:cNvSpPr>
+            <a:spLocks noGrp="1"/>
+          </p:cNvSpPr>
+          <p:nvPr>
+            <p:ph type="title"/>
+          </p:nvPr>
+        </p:nvSpPr>
+        <p:spPr>
+          <a:xfrm>
+            <a:off x="838200" y="0"/>
+            <a:ext cx="10515600" cy="1325563"/>
+          </a:xfrm>
+        </p:spPr>
+        <p:txBody>
+          <a:bodyPr/>
+          <a:lstStyle/>
+          <a:p>
+            <a:pPr algn="ctr"/>
+            <a:r>
+              <a:rPr lang="en-US" b="1" dirty="0">
+                <a:effectLst>
+                  <a:outerShdw blurRad="38100" dist="38100" dir="2700000" algn="tl">
+                    <a:srgbClr val="000000">
+                      <a:alpha val="43137"/>
+                    </a:srgbClr>
+                  </a:outerShdw>
+                </a:effectLst>
+              </a:rPr>
+              <a:t>Object Conclusions</a:t>
+            </a:r>
+          </a:p>
+        </p:txBody>
+      </p:sp>
+      <p:sp>
+        <p:nvSpPr>
+          <p:cNvPr id="3" name="Content Placeholder 2">
+            <a:extLst>
+              <a:ext uri="{FF2B5EF4-FFF2-40B4-BE49-F238E27FC236}">
+                <a16:creationId xmlns:a16="http://schemas.microsoft.com/office/drawing/2014/main" id="{3CBA01D1-4D8F-4CA7-AD83-FFCBE2AF0089}"/>
+              </a:ext>
+            </a:extLst>
+          </p:cNvPr>
+          <p:cNvSpPr>
+            <a:spLocks noGrp="1"/>
+          </p:cNvSpPr>
+          <p:nvPr>
+            <p:ph idx="1"/>
+          </p:nvPr>
+        </p:nvSpPr>
+        <p:spPr>
+          <a:xfrm>
+            <a:off x="1153885" y="1164771"/>
+            <a:ext cx="10199915" cy="5486400"/>
+          </a:xfrm>
+        </p:spPr>
+        <p:txBody>
+          <a:bodyPr>
+            <a:normAutofit/>
+          </a:bodyPr>
+          <a:lstStyle/>
+          <a:p>
+            <a:r>
+              <a:rPr lang="en-US" dirty="0"/>
+              <a:t> </a:t>
+            </a:r>
+            <a:r>
+              <a:rPr lang="en-US" b="1" dirty="0">
+                <a:effectLst>
+                  <a:outerShdw blurRad="38100" dist="38100" dir="2700000" algn="tl">
+                    <a:srgbClr val="000000">
+                      <a:alpha val="43137"/>
+                    </a:srgbClr>
+                  </a:outerShdw>
+                </a:effectLst>
+              </a:rPr>
+              <a:t>Representation is balanced for civilizations from across the globe</a:t>
+            </a:r>
+          </a:p>
+          <a:p>
+            <a:r>
+              <a:rPr lang="en-US" b="1" dirty="0">
+                <a:effectLst>
+                  <a:outerShdw blurRad="38100" dist="38100" dir="2700000" algn="tl">
+                    <a:srgbClr val="000000">
+                      <a:alpha val="43137"/>
+                    </a:srgbClr>
+                  </a:outerShdw>
+                </a:effectLst>
+              </a:rPr>
+              <a:t>Objects produced on paper or linens are most prevalent</a:t>
+            </a:r>
+          </a:p>
+          <a:p>
+            <a:pPr lvl="1"/>
+            <a:r>
+              <a:rPr lang="en-US" b="1" dirty="0">
+                <a:effectLst>
+                  <a:outerShdw blurRad="38100" dist="38100" dir="2700000" algn="tl">
+                    <a:srgbClr val="000000">
+                      <a:alpha val="43137"/>
+                    </a:srgbClr>
+                  </a:outerShdw>
+                </a:effectLst>
+              </a:rPr>
+              <a:t>More archival?, Storage?, Sentimental Value?, Commonality(unlikely), Most informative?</a:t>
+            </a:r>
+          </a:p>
+          <a:p>
+            <a:r>
+              <a:rPr lang="en-US" b="1" dirty="0">
+                <a:effectLst>
+                  <a:outerShdw blurRad="38100" dist="38100" dir="2700000" algn="tl">
+                    <a:srgbClr val="000000">
+                      <a:alpha val="43137"/>
+                    </a:srgbClr>
+                  </a:outerShdw>
+                </a:effectLst>
+              </a:rPr>
+              <a:t>Objects from Egypt are strongly represented (all Egyptian?)</a:t>
+            </a:r>
+          </a:p>
+          <a:p>
+            <a:r>
+              <a:rPr lang="en-US" b="1" dirty="0">
+                <a:effectLst>
+                  <a:outerShdw blurRad="38100" dist="38100" dir="2700000" algn="tl">
+                    <a:srgbClr val="000000">
+                      <a:alpha val="43137"/>
+                    </a:srgbClr>
+                  </a:outerShdw>
+                </a:effectLst>
+              </a:rPr>
+              <a:t>Greek culture is most commonly confirmed culture</a:t>
+            </a:r>
+          </a:p>
+          <a:p>
+            <a:r>
+              <a:rPr lang="en-US" b="1" dirty="0">
+                <a:effectLst>
+                  <a:outerShdw blurRad="38100" dist="38100" dir="2700000" algn="tl">
+                    <a:srgbClr val="000000">
+                      <a:alpha val="43137"/>
+                    </a:srgbClr>
+                  </a:outerShdw>
+                </a:effectLst>
+              </a:rPr>
+              <a:t>Data has inconsistencies</a:t>
+            </a:r>
+          </a:p>
+          <a:p>
+            <a:pPr lvl="1"/>
+            <a:r>
+              <a:rPr lang="en-US" b="1" dirty="0">
+                <a:effectLst>
+                  <a:outerShdw blurRad="38100" dist="38100" dir="2700000" algn="tl">
+                    <a:srgbClr val="000000">
+                      <a:alpha val="43137"/>
+                    </a:srgbClr>
+                  </a:outerShdw>
+                </a:effectLst>
+              </a:rPr>
+              <a:t>Items have been cataloged in different ways over time (151 years)</a:t>
+            </a:r>
+          </a:p>
+          <a:p>
+            <a:pPr lvl="2"/>
+            <a:r>
+              <a:rPr lang="en-US" b="1" dirty="0">
+                <a:effectLst>
+                  <a:outerShdw blurRad="38100" dist="38100" dir="2700000" algn="tl">
+                    <a:srgbClr val="000000">
+                      <a:alpha val="43137"/>
+                    </a:srgbClr>
+                  </a:outerShdw>
+                </a:effectLst>
+              </a:rPr>
+              <a:t>Egypt has almost 50% of it’s objects without classifications (</a:t>
+            </a:r>
+            <a:r>
+              <a:rPr lang="en-US" b="1" dirty="0" err="1">
+                <a:effectLst>
+                  <a:outerShdw blurRad="38100" dist="38100" dir="2700000" algn="tl">
+                    <a:srgbClr val="000000">
+                      <a:alpha val="43137"/>
+                    </a:srgbClr>
+                  </a:outerShdw>
+                </a:effectLst>
+              </a:rPr>
+              <a:t>ie</a:t>
+            </a:r>
+            <a:r>
+              <a:rPr lang="en-US" b="1" dirty="0">
+                <a:effectLst>
+                  <a:outerShdw blurRad="38100" dist="38100" dir="2700000" algn="tl">
+                    <a:srgbClr val="000000">
+                      <a:alpha val="43137"/>
+                    </a:srgbClr>
+                  </a:outerShdw>
+                </a:effectLst>
+              </a:rPr>
+              <a:t>, Sculpture, Glass)</a:t>
+            </a:r>
+          </a:p>
+          <a:p>
+            <a:pPr lvl="1"/>
+            <a:r>
+              <a:rPr lang="en-US" b="1" dirty="0">
+                <a:effectLst>
+                  <a:outerShdw blurRad="38100" dist="38100" dir="2700000" algn="tl">
+                    <a:srgbClr val="000000">
+                      <a:alpha val="43137"/>
+                    </a:srgbClr>
+                  </a:outerShdw>
+                </a:effectLst>
+              </a:rPr>
+              <a:t>42% of the data does not have a definitive cultural origin</a:t>
+            </a:r>
+          </a:p>
+          <a:p>
+            <a:r>
+              <a:rPr lang="en-US" b="1" dirty="0">
+                <a:effectLst>
+                  <a:outerShdw blurRad="38100" dist="38100" dir="2700000" algn="tl">
+                    <a:srgbClr val="000000">
+                      <a:alpha val="43137"/>
+                    </a:srgbClr>
+                  </a:outerShdw>
+                </a:effectLst>
+              </a:rPr>
+              <a:t>Varied results culture vs country of origin (data collection variables)</a:t>
+            </a:r>
+          </a:p>
+          <a:p>
+            <a:endParaRPr lang="en-US" b="1" dirty="0">
+              <a:effectLst>
+                <a:outerShdw blurRad="38100" dist="38100" dir="2700000" algn="tl">
+                  <a:srgbClr val="000000">
+                    <a:alpha val="43137"/>
+                  </a:srgbClr>
+                </a:outerShdw>
+              </a:effectLst>
+            </a:endParaRPr>
+          </a:p>
+        </p:txBody>
+      </p:sp>
+    </p:spTree>
+    <p:extLst>
+      <p:ext uri="{BB962C8B-B14F-4D97-AF65-F5344CB8AC3E}">
+        <p14:creationId xmlns:p14="http://schemas.microsoft.com/office/powerpoint/2010/main" val="476502415"/>
+      </p:ext>
+    </p:extLst>
+  </p:cSld>
+  <p:clrMapOvr>
+    <a:masterClrMapping/>
+  </p:clrMapOvr>
+</p:sld>
+</file>
+
+<file path=ppt/slides/slide13.xml><?xml version="1.0" encoding="utf-8"?>
 <p:sld xmlns:a="http://schemas.openxmlformats.org/drawingml/2006/main" xmlns:r="http://schemas.openxmlformats.org/officeDocument/2006/relationships" xmlns:p="http://schemas.openxmlformats.org/presentationml/2006/main">
   <p:cSld>
     <p:bg>
@@ -4371,6 +4192,10 @@
           </p:nvPr>
         </p:nvSpPr>
         <p:spPr>
+          <a:xfrm>
+            <a:off x="838200" y="347662"/>
+            <a:ext cx="10515600" cy="1325563"/>
+          </a:xfrm>
           <a:solidFill>
             <a:schemeClr val="bg2">
               <a:lumMod val="90000"/>
@@ -4382,9 +4207,18 @@
           <a:bodyPr/>
           <a:lstStyle/>
           <a:p>
-            <a:r>
-              <a:rPr lang="en-US" dirty="0"/>
-              <a:t>Conclusions</a:t>
+            <a:pPr algn="ctr"/>
+            <a:r>
+              <a:rPr lang="en-US" b="1" dirty="0">
+                <a:effectLst>
+                  <a:outerShdw blurRad="38100" dist="38100" dir="2700000" algn="tl">
+                    <a:srgbClr val="000000">
+                      <a:alpha val="43137"/>
+                    </a:srgbClr>
+                  </a:outerShdw>
+                </a:effectLst>
+              </a:rPr>
+              <a:t>Patronage Conclusions</a:t>
             </a:r>
           </a:p>
         </p:txBody>
@@ -4414,38 +4248,335 @@
           </a:solidFill>
         </p:spPr>
         <p:txBody>
-          <a:bodyPr/>
-          <a:lstStyle/>
-          <a:p>
-            <a:r>
-              <a:rPr lang="en-US" dirty="0"/>
-              <a:t>A more multi-indexed analysis would be necessary to more accurately represent the collection.</a:t>
+          <a:bodyPr>
+            <a:normAutofit/>
+          </a:bodyPr>
+          <a:lstStyle/>
+          <a:p>
+            <a:r>
+              <a:rPr lang="en-US" b="1" dirty="0">
+                <a:effectLst>
+                  <a:outerShdw blurRad="38100" dist="38100" dir="2700000" algn="tl">
+                    <a:srgbClr val="000000">
+                      <a:alpha val="43137"/>
+                    </a:srgbClr>
+                  </a:outerShdw>
+                </a:effectLst>
+              </a:rPr>
+              <a:t>Over 151 years 35,124 individuals have contributed the museum with objects</a:t>
+            </a:r>
+          </a:p>
+          <a:p>
+            <a:r>
+              <a:rPr lang="en-US" b="1" dirty="0">
+                <a:effectLst>
+                  <a:outerShdw blurRad="38100" dist="38100" dir="2700000" algn="tl">
+                    <a:srgbClr val="000000">
+                      <a:alpha val="43137"/>
+                    </a:srgbClr>
+                  </a:outerShdw>
+                </a:effectLst>
+              </a:rPr>
+              <a:t>The collection relies heavily on benefactors vs. acquiring objects </a:t>
             </a:r>
           </a:p>
           <a:p>
             <a:pPr lvl="1"/>
             <a:r>
-              <a:rPr lang="en-US" dirty="0"/>
-              <a:t>It was observed that many records in the dataset were inconsistent possibly due to the objects life span and provenance.</a:t>
-            </a:r>
-          </a:p>
-          <a:p>
-            <a:r>
-              <a:rPr lang="en-US" dirty="0"/>
-              <a:t>The collection relies heavily on benefactors over actively acquiring objects itself.</a:t>
-            </a:r>
-          </a:p>
-          <a:p>
-            <a:r>
-              <a:rPr lang="en-US" dirty="0"/>
-              <a:t> Balanced representation of historical civilizations from across the globe.</a:t>
-            </a:r>
-          </a:p>
-          <a:p>
-            <a:r>
-              <a:rPr lang="en-US" dirty="0"/>
-              <a:t>The average number of objects from each benefactor is 8; the median is 1 and the largest was 2,319.</a:t>
-            </a:r>
+              <a:rPr lang="en-US" b="1" dirty="0">
+                <a:effectLst>
+                  <a:outerShdw blurRad="38100" dist="38100" dir="2700000" algn="tl">
+                    <a:srgbClr val="000000">
+                      <a:alpha val="43137"/>
+                    </a:srgbClr>
+                  </a:outerShdw>
+                </a:effectLst>
+              </a:rPr>
+              <a:t>Only 44,027 objects were purchased representing only 9% of the entire collection</a:t>
+            </a:r>
+          </a:p>
+          <a:p>
+            <a:pPr lvl="1"/>
+            <a:r>
+              <a:rPr lang="en-US" b="1" dirty="0">
+                <a:effectLst>
+                  <a:outerShdw blurRad="38100" dist="38100" dir="2700000" algn="tl">
+                    <a:srgbClr val="000000">
+                      <a:alpha val="43137"/>
+                    </a:srgbClr>
+                  </a:outerShdw>
+                </a:effectLst>
+              </a:rPr>
+              <a:t>In 1963 the museum acquired its largest number of objects</a:t>
+            </a:r>
+          </a:p>
+          <a:p>
+            <a:pPr lvl="2"/>
+            <a:r>
+              <a:rPr lang="en-US" b="1" dirty="0">
+                <a:effectLst>
+                  <a:outerShdw blurRad="38100" dist="38100" dir="2700000" algn="tl">
+                    <a:srgbClr val="000000">
+                      <a:alpha val="43137"/>
+                    </a:srgbClr>
+                  </a:outerShdw>
+                </a:effectLst>
+              </a:rPr>
+              <a:t>79% was from the largest historical benefactor Jefferson R. Burdick</a:t>
+            </a:r>
+          </a:p>
+          <a:p>
+            <a:pPr lvl="1"/>
+            <a:r>
+              <a:rPr lang="en-US" b="1" dirty="0">
+                <a:effectLst>
+                  <a:outerShdw blurRad="38100" dist="38100" dir="2700000" algn="tl">
+                    <a:srgbClr val="000000">
+                      <a:alpha val="43137"/>
+                    </a:srgbClr>
+                  </a:outerShdw>
+                </a:effectLst>
+              </a:rPr>
+              <a:t>Median number of objects gifted is 1457</a:t>
+            </a:r>
+          </a:p>
+        </p:txBody>
+      </p:sp>
+      <p:sp>
+        <p:nvSpPr>
+          <p:cNvPr id="3" name="Rectangle 1">
+            <a:extLst>
+              <a:ext uri="{FF2B5EF4-FFF2-40B4-BE49-F238E27FC236}">
+                <a16:creationId xmlns:a16="http://schemas.microsoft.com/office/drawing/2014/main" id="{AC078344-380E-462D-BC9C-E4CD6A4F1EEB}"/>
+              </a:ext>
+            </a:extLst>
+          </p:cNvPr>
+          <p:cNvSpPr>
+            <a:spLocks noChangeArrowheads="1"/>
+          </p:cNvSpPr>
+          <p:nvPr/>
+        </p:nvSpPr>
+        <p:spPr bwMode="auto">
+          <a:xfrm>
+            <a:off x="0" y="0"/>
+            <a:ext cx="12192000" cy="457200"/>
+          </a:xfrm>
+          <a:prstGeom prst="rect">
+            <a:avLst/>
+          </a:prstGeom>
+          <a:noFill/>
+          <a:ln>
+            <a:noFill/>
+          </a:ln>
+          <a:effectLst/>
+          <a:extLst>
+            <a:ext uri="{909E8E84-426E-40DD-AFC4-6F175D3DCCD1}">
+              <a14:hiddenFill xmlns:a14="http://schemas.microsoft.com/office/drawing/2010/main">
+                <a:solidFill>
+                  <a:schemeClr val="accent1"/>
+                </a:solidFill>
+              </a14:hiddenFill>
+            </a:ext>
+            <a:ext uri="{91240B29-F687-4F45-9708-019B960494DF}">
+              <a14:hiddenLine xmlns:a14="http://schemas.microsoft.com/office/drawing/2010/main" w="9525">
+                <a:solidFill>
+                  <a:schemeClr val="tx1"/>
+                </a:solidFill>
+                <a:miter lim="800000"/>
+                <a:headEnd/>
+                <a:tailEnd/>
+              </a14:hiddenLine>
+            </a:ext>
+            <a:ext uri="{AF507438-7753-43E0-B8FC-AC1667EBCBE1}">
+              <a14:hiddenEffects xmlns:a14="http://schemas.microsoft.com/office/drawing/2010/main">
+                <a:effectLst>
+                  <a:outerShdw dist="35921" dir="2700000" algn="ctr" rotWithShape="0">
+                    <a:schemeClr val="bg2"/>
+                  </a:outerShdw>
+                </a:effectLst>
+              </a14:hiddenEffects>
+            </a:ext>
+          </a:extLst>
+        </p:spPr>
+        <p:txBody>
+          <a:bodyPr vert="horz" wrap="none" lIns="0" tIns="0" rIns="0" bIns="0" numCol="1" anchor="ctr" anchorCtr="0" compatLnSpc="1">
+            <a:prstTxWarp prst="textNoShape">
+              <a:avLst/>
+            </a:prstTxWarp>
+            <a:spAutoFit/>
+          </a:bodyPr>
+          <a:lstStyle/>
+          <a:p>
+            <a:pPr marL="0" marR="0" lvl="0" indent="0" algn="l" defTabSz="914400" rtl="0" eaLnBrk="0" fontAlgn="base" latinLnBrk="0" hangingPunct="0">
+              <a:lnSpc>
+                <a:spcPct val="100000"/>
+              </a:lnSpc>
+              <a:spcBef>
+                <a:spcPct val="0"/>
+              </a:spcBef>
+              <a:spcAft>
+                <a:spcPct val="0"/>
+              </a:spcAft>
+              <a:buClrTx/>
+              <a:buSzTx/>
+              <a:buFontTx/>
+              <a:buNone/>
+              <a:tabLst/>
+            </a:pPr>
+            <a:r>
+              <a:rPr kumimoji="0" lang="en-US" altLang="en-US" sz="800" b="0" i="0" u="none" strike="noStrike" cap="none" normalizeH="0" baseline="0">
+                <a:ln>
+                  <a:noFill/>
+                </a:ln>
+                <a:solidFill>
+                  <a:srgbClr val="B4BCDE"/>
+                </a:solidFill>
+                <a:effectLst/>
+                <a:latin typeface="Courier New" panose="02070309020205020404" pitchFamily="49" charset="0"/>
+              </a:rPr>
+              <a:t>Jefferson R. Burdick</a:t>
+            </a:r>
+            <a:r>
+              <a:rPr kumimoji="0" lang="en-US" altLang="en-US" sz="400" b="0" i="0" u="none" strike="noStrike" cap="none" normalizeH="0" baseline="0">
+                <a:ln>
+                  <a:noFill/>
+                </a:ln>
+                <a:solidFill>
+                  <a:schemeClr val="tx1"/>
+                </a:solidFill>
+                <a:effectLst/>
+              </a:rPr>
+              <a:t> </a:t>
+            </a:r>
+            <a:endParaRPr kumimoji="0" lang="en-US" altLang="en-US" sz="1800" b="0" i="0" u="none" strike="noStrike" cap="none" normalizeH="0" baseline="0">
+              <a:ln>
+                <a:noFill/>
+              </a:ln>
+              <a:solidFill>
+                <a:schemeClr val="tx1"/>
+              </a:solidFill>
+              <a:effectLst/>
+              <a:latin typeface="Arial" panose="020B0604020202020204" pitchFamily="34" charset="0"/>
+            </a:endParaRPr>
+          </a:p>
+        </p:txBody>
+      </p:sp>
+      <p:sp>
+        <p:nvSpPr>
+          <p:cNvPr id="4" name="Rectangle 2">
+            <a:extLst>
+              <a:ext uri="{FF2B5EF4-FFF2-40B4-BE49-F238E27FC236}">
+                <a16:creationId xmlns:a16="http://schemas.microsoft.com/office/drawing/2014/main" id="{E90F7A70-1F52-4C1A-A0B4-4F907773F3AE}"/>
+              </a:ext>
+            </a:extLst>
+          </p:cNvPr>
+          <p:cNvSpPr>
+            <a:spLocks noChangeArrowheads="1"/>
+          </p:cNvSpPr>
+          <p:nvPr/>
+        </p:nvSpPr>
+        <p:spPr bwMode="auto">
+          <a:xfrm>
+            <a:off x="152400" y="152400"/>
+            <a:ext cx="12192000" cy="457200"/>
+          </a:xfrm>
+          <a:prstGeom prst="rect">
+            <a:avLst/>
+          </a:prstGeom>
+          <a:noFill/>
+          <a:ln>
+            <a:noFill/>
+          </a:ln>
+          <a:effectLst/>
+          <a:extLst>
+            <a:ext uri="{909E8E84-426E-40DD-AFC4-6F175D3DCCD1}">
+              <a14:hiddenFill xmlns:a14="http://schemas.microsoft.com/office/drawing/2010/main">
+                <a:solidFill>
+                  <a:schemeClr val="accent1"/>
+                </a:solidFill>
+              </a14:hiddenFill>
+            </a:ext>
+            <a:ext uri="{91240B29-F687-4F45-9708-019B960494DF}">
+              <a14:hiddenLine xmlns:a14="http://schemas.microsoft.com/office/drawing/2010/main" w="9525">
+                <a:solidFill>
+                  <a:schemeClr val="tx1"/>
+                </a:solidFill>
+                <a:miter lim="800000"/>
+                <a:headEnd/>
+                <a:tailEnd/>
+              </a14:hiddenLine>
+            </a:ext>
+            <a:ext uri="{AF507438-7753-43E0-B8FC-AC1667EBCBE1}">
+              <a14:hiddenEffects xmlns:a14="http://schemas.microsoft.com/office/drawing/2010/main">
+                <a:effectLst>
+                  <a:outerShdw dist="35921" dir="2700000" algn="ctr" rotWithShape="0">
+                    <a:schemeClr val="bg2"/>
+                  </a:outerShdw>
+                </a:effectLst>
+              </a14:hiddenEffects>
+            </a:ext>
+          </a:extLst>
+        </p:spPr>
+        <p:txBody>
+          <a:bodyPr vert="horz" wrap="none" lIns="0" tIns="0" rIns="0" bIns="0" numCol="1" anchor="ctr" anchorCtr="0" compatLnSpc="1">
+            <a:prstTxWarp prst="textNoShape">
+              <a:avLst/>
+            </a:prstTxWarp>
+            <a:spAutoFit/>
+          </a:bodyPr>
+          <a:lstStyle/>
+          <a:p>
+            <a:pPr marL="0" marR="0" lvl="0" indent="0" algn="l" defTabSz="914400" rtl="0" eaLnBrk="0" fontAlgn="base" latinLnBrk="0" hangingPunct="0">
+              <a:lnSpc>
+                <a:spcPct val="100000"/>
+              </a:lnSpc>
+              <a:spcBef>
+                <a:spcPct val="0"/>
+              </a:spcBef>
+              <a:spcAft>
+                <a:spcPct val="0"/>
+              </a:spcAft>
+              <a:buClrTx/>
+              <a:buSzTx/>
+              <a:buFontTx/>
+              <a:buNone/>
+              <a:tabLst/>
+            </a:pPr>
+            <a:r>
+              <a:rPr kumimoji="0" lang="en-US" altLang="en-US" sz="800" b="0" i="0" u="none" strike="noStrike" cap="none" normalizeH="0" baseline="0">
+                <a:ln>
+                  <a:noFill/>
+                </a:ln>
+                <a:solidFill>
+                  <a:srgbClr val="B4BCDE"/>
+                </a:solidFill>
+                <a:effectLst/>
+                <a:latin typeface="Courier New" panose="02070309020205020404" pitchFamily="49" charset="0"/>
+              </a:rPr>
+              <a:t>Jefferson R. Burdick</a:t>
+            </a:r>
+            <a:r>
+              <a:rPr kumimoji="0" lang="en-US" altLang="en-US" sz="400" b="0" i="0" u="none" strike="noStrike" cap="none" normalizeH="0" baseline="0">
+                <a:ln>
+                  <a:noFill/>
+                </a:ln>
+                <a:solidFill>
+                  <a:schemeClr val="tx1"/>
+                </a:solidFill>
+                <a:effectLst/>
+              </a:rPr>
+              <a:t> </a:t>
+            </a:r>
+            <a:endParaRPr kumimoji="0" lang="en-US" altLang="en-US" sz="1800" b="0" i="0" u="none" strike="noStrike" cap="none" normalizeH="0" baseline="0">
+              <a:ln>
+                <a:noFill/>
+              </a:ln>
+              <a:solidFill>
+                <a:schemeClr val="tx1"/>
+              </a:solidFill>
+              <a:effectLst/>
+              <a:latin typeface="Arial" panose="020B0604020202020204" pitchFamily="34" charset="0"/>
+            </a:endParaRPr>
           </a:p>
         </p:txBody>
       </p:sp>
@@ -5419,14 +5550,19 @@
             <p:ph type="title"/>
           </p:nvPr>
         </p:nvSpPr>
-        <p:spPr/>
+        <p:spPr>
+          <a:xfrm>
+            <a:off x="513080" y="155177"/>
+            <a:ext cx="10515600" cy="1325563"/>
+          </a:xfrm>
+        </p:spPr>
         <p:txBody>
           <a:bodyPr/>
           <a:lstStyle/>
           <a:p>
             <a:r>
               <a:rPr lang="en-US" b="1" dirty="0"/>
-              <a:t>Number of Objects per Country</a:t>
+              <a:t>Top Object by Culture and Classification</a:t>
             </a:r>
             <a:br>
               <a:rPr lang="en-US" b="1" dirty="0"/>
@@ -5499,10 +5635,10 @@
       </p:sp>
       <p:pic>
         <p:nvPicPr>
-          <p:cNvPr id="4" name="Picture 3">
-            <a:extLst>
-              <a:ext uri="{FF2B5EF4-FFF2-40B4-BE49-F238E27FC236}">
-                <a16:creationId xmlns:a16="http://schemas.microsoft.com/office/drawing/2014/main" id="{D294529F-A5EE-4FB0-BD9C-5A66E0F2BCCB}"/>
+          <p:cNvPr id="10" name="Picture 9">
+            <a:extLst>
+              <a:ext uri="{FF2B5EF4-FFF2-40B4-BE49-F238E27FC236}">
+                <a16:creationId xmlns:a16="http://schemas.microsoft.com/office/drawing/2014/main" id="{10D41C82-9BA9-4FE5-85A1-F49DF0D85231}"/>
               </a:ext>
             </a:extLst>
           </p:cNvPr>
@@ -5511,7 +5647,7 @@
           </p:cNvPicPr>
           <p:nvPr/>
         </p:nvPicPr>
-        <p:blipFill>
+        <p:blipFill rotWithShape="1">
           <a:blip r:embed="rId3">
             <a:extLst>
               <a:ext uri="{28A0092B-C50C-407E-A947-70E740481C1C}">
@@ -5519,13 +5655,13 @@
               </a:ext>
             </a:extLst>
           </a:blip>
-          <a:srcRect/>
+          <a:srcRect l="21067" t="5324" r="4903" b="12445"/>
           <a:stretch/>
         </p:blipFill>
         <p:spPr>
           <a:xfrm>
-            <a:off x="608350" y="1599783"/>
-            <a:ext cx="10975299" cy="3658433"/>
+            <a:off x="609600" y="1158716"/>
+            <a:ext cx="8630920" cy="5639435"/>
           </a:xfrm>
           <a:prstGeom prst="rect">
             <a:avLst/>
@@ -5607,10 +5743,10 @@
       </p:sp>
       <p:pic>
         <p:nvPicPr>
-          <p:cNvPr id="7" name="Content Placeholder 6">
-            <a:extLst>
-              <a:ext uri="{FF2B5EF4-FFF2-40B4-BE49-F238E27FC236}">
-                <a16:creationId xmlns:a16="http://schemas.microsoft.com/office/drawing/2014/main" id="{C5E642F6-6625-4DA5-A0F0-A632D45FA328}"/>
+          <p:cNvPr id="11" name="Content Placeholder 10">
+            <a:extLst>
+              <a:ext uri="{FF2B5EF4-FFF2-40B4-BE49-F238E27FC236}">
+                <a16:creationId xmlns:a16="http://schemas.microsoft.com/office/drawing/2014/main" id="{2997935B-41BD-401D-8739-C59B9AE3FD7B}"/>
               </a:ext>
             </a:extLst>
           </p:cNvPr>
@@ -5635,8 +5771,8 @@
         </p:blipFill>
         <p:spPr>
           <a:xfrm>
-            <a:off x="2001520" y="1468067"/>
-            <a:ext cx="7061200" cy="4707466"/>
+            <a:off x="2270283" y="1391920"/>
+            <a:ext cx="7651433" cy="5100955"/>
           </a:xfrm>
         </p:spPr>
       </p:pic>
@@ -5751,8 +5887,8 @@
         </p:blipFill>
         <p:spPr>
           <a:xfrm>
-            <a:off x="741680" y="1454158"/>
-            <a:ext cx="10846810" cy="5160002"/>
+            <a:off x="1719101" y="1690688"/>
+            <a:ext cx="8753797" cy="4164322"/>
           </a:xfrm>
         </p:spPr>
       </p:pic>
@@ -5822,6 +5958,7 @@
           <a:bodyPr/>
           <a:lstStyle/>
           <a:p>
+            <a:pPr algn="ctr"/>
             <a:r>
               <a:rPr lang="en-US" b="1" dirty="0"/>
               <a:t>Top Ten Countries</a:t>
@@ -5831,10 +5968,10 @@
       </p:sp>
       <p:pic>
         <p:nvPicPr>
-          <p:cNvPr id="5" name="Content Placeholder 4">
-            <a:extLst>
-              <a:ext uri="{FF2B5EF4-FFF2-40B4-BE49-F238E27FC236}">
-                <a16:creationId xmlns:a16="http://schemas.microsoft.com/office/drawing/2014/main" id="{CD6233E9-0183-4C41-BA57-9EEE83FB8954}"/>
+          <p:cNvPr id="11" name="Content Placeholder 10">
+            <a:extLst>
+              <a:ext uri="{FF2B5EF4-FFF2-40B4-BE49-F238E27FC236}">
+                <a16:creationId xmlns:a16="http://schemas.microsoft.com/office/drawing/2014/main" id="{5D3B1960-09ED-4686-AAB9-E9858A29B740}"/>
               </a:ext>
             </a:extLst>
           </p:cNvPr>
@@ -5845,7 +5982,7 @@
             <p:ph idx="1"/>
           </p:nvPr>
         </p:nvPicPr>
-        <p:blipFill>
+        <p:blipFill rotWithShape="1">
           <a:blip r:embed="rId3">
             <a:extLst>
               <a:ext uri="{28A0092B-C50C-407E-A947-70E740481C1C}">
@@ -5853,14 +5990,13 @@
               </a:ext>
             </a:extLst>
           </a:blip>
-          <a:stretch>
-            <a:fillRect/>
-          </a:stretch>
+          <a:srcRect l="14277" t="4119" r="2334" b="10891"/>
+          <a:stretch/>
         </p:blipFill>
         <p:spPr>
           <a:xfrm>
-            <a:off x="2192482" y="1398950"/>
-            <a:ext cx="7807036" cy="5204688"/>
+            <a:off x="3542121" y="1287015"/>
+            <a:ext cx="5107757" cy="5205860"/>
           </a:xfrm>
         </p:spPr>
       </p:pic>
@@ -5918,7 +6054,12 @@
             <p:ph type="title"/>
           </p:nvPr>
         </p:nvSpPr>
-        <p:spPr/>
+        <p:spPr>
+          <a:xfrm>
+            <a:off x="838200" y="114661"/>
+            <a:ext cx="10515600" cy="1325563"/>
+          </a:xfrm>
+        </p:spPr>
         <p:txBody>
           <a:bodyPr>
             <a:normAutofit/>
@@ -5927,17 +6068,51 @@
           <a:p>
             <a:r>
               <a:rPr lang="en-US" sz="3600" dirty="0"/>
-              <a:t>Select Countries: Vanuatu Breakdown by Object Type</a:t>
+              <a:t>Select Countries: Egypt Breakdown by Object Type</a:t>
+            </a:r>
+          </a:p>
+        </p:txBody>
+      </p:sp>
+      <p:sp>
+        <p:nvSpPr>
+          <p:cNvPr id="4" name="Text Placeholder 3">
+            <a:extLst>
+              <a:ext uri="{FF2B5EF4-FFF2-40B4-BE49-F238E27FC236}">
+                <a16:creationId xmlns:a16="http://schemas.microsoft.com/office/drawing/2014/main" id="{B9A91CA8-FBE0-4977-B36B-6EF552F23B97}"/>
+              </a:ext>
+            </a:extLst>
+          </p:cNvPr>
+          <p:cNvSpPr>
+            <a:spLocks noGrp="1"/>
+          </p:cNvSpPr>
+          <p:nvPr>
+            <p:ph type="body" sz="quarter" idx="3"/>
+          </p:nvPr>
+        </p:nvSpPr>
+        <p:spPr>
+          <a:xfrm>
+            <a:off x="7078077" y="1440224"/>
+            <a:ext cx="5183188" cy="500928"/>
+          </a:xfrm>
+        </p:spPr>
+        <p:txBody>
+          <a:bodyPr/>
+          <a:lstStyle/>
+          <a:p>
+            <a:pPr algn="ctr"/>
+            <a:r>
+              <a:rPr lang="en-US" dirty="0"/>
+              <a:t>Egyptian Sculpture</a:t>
             </a:r>
           </a:p>
         </p:txBody>
       </p:sp>
       <p:pic>
         <p:nvPicPr>
-          <p:cNvPr id="7" name="Content Placeholder 6">
-            <a:extLst>
-              <a:ext uri="{FF2B5EF4-FFF2-40B4-BE49-F238E27FC236}">
-                <a16:creationId xmlns:a16="http://schemas.microsoft.com/office/drawing/2014/main" id="{404C958D-46E2-4E55-95BD-3554D96E5E9B}"/>
+          <p:cNvPr id="13" name="Content Placeholder 12">
+            <a:extLst>
+              <a:ext uri="{FF2B5EF4-FFF2-40B4-BE49-F238E27FC236}">
+                <a16:creationId xmlns:a16="http://schemas.microsoft.com/office/drawing/2014/main" id="{21B6AEBE-CEE3-435E-9FA7-0E91A6707A31}"/>
               </a:ext>
             </a:extLst>
           </p:cNvPr>
@@ -5945,78 +6120,11 @@
             <a:picLocks noGrp="1" noChangeAspect="1"/>
           </p:cNvPicPr>
           <p:nvPr>
-            <p:ph sz="half" idx="2"/>
+            <p:ph sz="quarter" idx="4"/>
           </p:nvPr>
         </p:nvPicPr>
         <p:blipFill>
           <a:blip r:embed="rId2">
-            <a:extLst>
-              <a:ext uri="{28A0092B-C50C-407E-A947-70E740481C1C}">
-                <a14:useLocalDpi xmlns:a14="http://schemas.microsoft.com/office/drawing/2010/main" val="0"/>
-              </a:ext>
-            </a:extLst>
-          </a:blip>
-          <a:stretch/>
-        </p:blipFill>
-        <p:spPr>
-          <a:xfrm>
-            <a:off x="0" y="1309110"/>
-            <a:ext cx="5548890" cy="5548890"/>
-          </a:xfrm>
-        </p:spPr>
-      </p:pic>
-      <p:sp>
-        <p:nvSpPr>
-          <p:cNvPr id="4" name="Text Placeholder 3">
-            <a:extLst>
-              <a:ext uri="{FF2B5EF4-FFF2-40B4-BE49-F238E27FC236}">
-                <a16:creationId xmlns:a16="http://schemas.microsoft.com/office/drawing/2014/main" id="{B9A91CA8-FBE0-4977-B36B-6EF552F23B97}"/>
-              </a:ext>
-            </a:extLst>
-          </p:cNvPr>
-          <p:cNvSpPr>
-            <a:spLocks noGrp="1"/>
-          </p:cNvSpPr>
-          <p:nvPr>
-            <p:ph type="body" sz="quarter" idx="3"/>
-          </p:nvPr>
-        </p:nvSpPr>
-        <p:spPr>
-          <a:xfrm>
-            <a:off x="6169024" y="1440224"/>
-            <a:ext cx="5183188" cy="500928"/>
-          </a:xfrm>
-        </p:spPr>
-        <p:txBody>
-          <a:bodyPr/>
-          <a:lstStyle/>
-          <a:p>
-            <a:pPr algn="ctr"/>
-            <a:r>
-              <a:rPr lang="en-US" dirty="0"/>
-              <a:t>Vanuatu Platter</a:t>
-            </a:r>
-          </a:p>
-        </p:txBody>
-      </p:sp>
-      <p:pic>
-        <p:nvPicPr>
-          <p:cNvPr id="8" name="Content Placeholder 7">
-            <a:extLst>
-              <a:ext uri="{FF2B5EF4-FFF2-40B4-BE49-F238E27FC236}">
-                <a16:creationId xmlns:a16="http://schemas.microsoft.com/office/drawing/2014/main" id="{DA72BBB2-7B19-405D-974D-60C36B82BE7A}"/>
-              </a:ext>
-            </a:extLst>
-          </p:cNvPr>
-          <p:cNvPicPr>
-            <a:picLocks noGrp="1" noChangeAspect="1"/>
-          </p:cNvPicPr>
-          <p:nvPr>
-            <p:ph sz="quarter" idx="4"/>
-          </p:nvPr>
-        </p:nvPicPr>
-        <p:blipFill>
-          <a:blip r:embed="rId3">
             <a:extLst>
               <a:ext uri="{28A0092B-C50C-407E-A947-70E740481C1C}">
                 <a14:useLocalDpi xmlns:a14="http://schemas.microsoft.com/office/drawing/2010/main" val="0"/>
@@ -6029,17 +6137,46 @@
         </p:blipFill>
         <p:spPr>
           <a:xfrm>
-            <a:off x="6974463" y="2007391"/>
-            <a:ext cx="3572310" cy="4763082"/>
+            <a:off x="8239760" y="2007824"/>
+            <a:ext cx="2859823" cy="4289198"/>
           </a:xfrm>
           <a:effectLst>
-            <a:outerShdw blurRad="546100" dist="50800" dir="5400000" algn="ctr" rotWithShape="0">
-              <a:srgbClr val="000000">
-                <a:alpha val="43137"/>
-              </a:srgbClr>
-            </a:outerShdw>
-            <a:softEdge rad="215900"/>
+            <a:softEdge rad="127000"/>
           </a:effectLst>
+        </p:spPr>
+      </p:pic>
+      <p:pic>
+        <p:nvPicPr>
+          <p:cNvPr id="21" name="Content Placeholder 20">
+            <a:extLst>
+              <a:ext uri="{FF2B5EF4-FFF2-40B4-BE49-F238E27FC236}">
+                <a16:creationId xmlns:a16="http://schemas.microsoft.com/office/drawing/2014/main" id="{FCA90C18-DFB5-48C4-B466-23AF6194B2E6}"/>
+              </a:ext>
+            </a:extLst>
+          </p:cNvPr>
+          <p:cNvPicPr>
+            <a:picLocks noGrp="1" noChangeAspect="1"/>
+          </p:cNvPicPr>
+          <p:nvPr>
+            <p:ph sz="half" idx="2"/>
+          </p:nvPr>
+        </p:nvPicPr>
+        <p:blipFill rotWithShape="1">
+          <a:blip r:embed="rId3">
+            <a:extLst>
+              <a:ext uri="{28A0092B-C50C-407E-A947-70E740481C1C}">
+                <a14:useLocalDpi xmlns:a14="http://schemas.microsoft.com/office/drawing/2010/main" val="0"/>
+              </a:ext>
+            </a:extLst>
+          </a:blip>
+          <a:srcRect l="18638" t="4532" b="11090"/>
+          <a:stretch/>
+        </p:blipFill>
+        <p:spPr>
+          <a:xfrm>
+            <a:off x="1317903" y="1338553"/>
+            <a:ext cx="5790437" cy="5004189"/>
+          </a:xfrm>
         </p:spPr>
       </p:pic>
     </p:spTree>

</xml_diff>

<commit_message>
final touches to pp
</commit_message>
<xml_diff>
--- a/Analysis of th MET.pptx
+++ b/Analysis of th MET.pptx
@@ -6,18 +6,22 @@
   </p:sldMasterIdLst>
   <p:sldIdLst>
     <p:sldId id="256" r:id="rId2"/>
-    <p:sldId id="257" r:id="rId3"/>
-    <p:sldId id="258" r:id="rId4"/>
-    <p:sldId id="259" r:id="rId5"/>
-    <p:sldId id="263" r:id="rId6"/>
-    <p:sldId id="260" r:id="rId7"/>
-    <p:sldId id="262" r:id="rId8"/>
-    <p:sldId id="261" r:id="rId9"/>
-    <p:sldId id="267" r:id="rId10"/>
-    <p:sldId id="264" r:id="rId11"/>
-    <p:sldId id="268" r:id="rId12"/>
-    <p:sldId id="270" r:id="rId13"/>
-    <p:sldId id="269" r:id="rId14"/>
+    <p:sldId id="272" r:id="rId3"/>
+    <p:sldId id="257" r:id="rId4"/>
+    <p:sldId id="258" r:id="rId5"/>
+    <p:sldId id="259" r:id="rId6"/>
+    <p:sldId id="263" r:id="rId7"/>
+    <p:sldId id="260" r:id="rId8"/>
+    <p:sldId id="262" r:id="rId9"/>
+    <p:sldId id="261" r:id="rId10"/>
+    <p:sldId id="267" r:id="rId11"/>
+    <p:sldId id="264" r:id="rId12"/>
+    <p:sldId id="268" r:id="rId13"/>
+    <p:sldId id="270" r:id="rId14"/>
+    <p:sldId id="269" r:id="rId15"/>
+    <p:sldId id="273" r:id="rId16"/>
+    <p:sldId id="274" r:id="rId17"/>
+    <p:sldId id="271" r:id="rId18"/>
   </p:sldIdLst>
   <p:sldSz cx="12192000" cy="6858000"/>
   <p:notesSz cx="6858000" cy="9144000"/>
@@ -271,7 +275,7 @@
           <a:p>
             <a:fld id="{8FC04297-0A4E-4A07-84A0-4091E8BEFAFA}" type="datetimeFigureOut">
               <a:rPr lang="en-US" smtClean="0"/>
-              <a:t>6/28/2021</a:t>
+              <a:t>6/29/2021</a:t>
             </a:fld>
             <a:endParaRPr lang="en-US"/>
           </a:p>
@@ -469,7 +473,7 @@
           <a:p>
             <a:fld id="{8FC04297-0A4E-4A07-84A0-4091E8BEFAFA}" type="datetimeFigureOut">
               <a:rPr lang="en-US" smtClean="0"/>
-              <a:t>6/28/2021</a:t>
+              <a:t>6/29/2021</a:t>
             </a:fld>
             <a:endParaRPr lang="en-US"/>
           </a:p>
@@ -677,7 +681,7 @@
           <a:p>
             <a:fld id="{8FC04297-0A4E-4A07-84A0-4091E8BEFAFA}" type="datetimeFigureOut">
               <a:rPr lang="en-US" smtClean="0"/>
-              <a:t>6/28/2021</a:t>
+              <a:t>6/29/2021</a:t>
             </a:fld>
             <a:endParaRPr lang="en-US"/>
           </a:p>
@@ -875,7 +879,7 @@
           <a:p>
             <a:fld id="{8FC04297-0A4E-4A07-84A0-4091E8BEFAFA}" type="datetimeFigureOut">
               <a:rPr lang="en-US" smtClean="0"/>
-              <a:t>6/28/2021</a:t>
+              <a:t>6/29/2021</a:t>
             </a:fld>
             <a:endParaRPr lang="en-US"/>
           </a:p>
@@ -1150,7 +1154,7 @@
           <a:p>
             <a:fld id="{8FC04297-0A4E-4A07-84A0-4091E8BEFAFA}" type="datetimeFigureOut">
               <a:rPr lang="en-US" smtClean="0"/>
-              <a:t>6/28/2021</a:t>
+              <a:t>6/29/2021</a:t>
             </a:fld>
             <a:endParaRPr lang="en-US"/>
           </a:p>
@@ -1415,7 +1419,7 @@
           <a:p>
             <a:fld id="{8FC04297-0A4E-4A07-84A0-4091E8BEFAFA}" type="datetimeFigureOut">
               <a:rPr lang="en-US" smtClean="0"/>
-              <a:t>6/28/2021</a:t>
+              <a:t>6/29/2021</a:t>
             </a:fld>
             <a:endParaRPr lang="en-US"/>
           </a:p>
@@ -1827,7 +1831,7 @@
           <a:p>
             <a:fld id="{8FC04297-0A4E-4A07-84A0-4091E8BEFAFA}" type="datetimeFigureOut">
               <a:rPr lang="en-US" smtClean="0"/>
-              <a:t>6/28/2021</a:t>
+              <a:t>6/29/2021</a:t>
             </a:fld>
             <a:endParaRPr lang="en-US"/>
           </a:p>
@@ -1968,7 +1972,7 @@
           <a:p>
             <a:fld id="{8FC04297-0A4E-4A07-84A0-4091E8BEFAFA}" type="datetimeFigureOut">
               <a:rPr lang="en-US" smtClean="0"/>
-              <a:t>6/28/2021</a:t>
+              <a:t>6/29/2021</a:t>
             </a:fld>
             <a:endParaRPr lang="en-US"/>
           </a:p>
@@ -2081,7 +2085,7 @@
           <a:p>
             <a:fld id="{8FC04297-0A4E-4A07-84A0-4091E8BEFAFA}" type="datetimeFigureOut">
               <a:rPr lang="en-US" smtClean="0"/>
-              <a:t>6/28/2021</a:t>
+              <a:t>6/29/2021</a:t>
             </a:fld>
             <a:endParaRPr lang="en-US"/>
           </a:p>
@@ -2392,7 +2396,7 @@
           <a:p>
             <a:fld id="{8FC04297-0A4E-4A07-84A0-4091E8BEFAFA}" type="datetimeFigureOut">
               <a:rPr lang="en-US" smtClean="0"/>
-              <a:t>6/28/2021</a:t>
+              <a:t>6/29/2021</a:t>
             </a:fld>
             <a:endParaRPr lang="en-US"/>
           </a:p>
@@ -2680,7 +2684,7 @@
           <a:p>
             <a:fld id="{8FC04297-0A4E-4A07-84A0-4091E8BEFAFA}" type="datetimeFigureOut">
               <a:rPr lang="en-US" smtClean="0"/>
-              <a:t>6/28/2021</a:t>
+              <a:t>6/29/2021</a:t>
             </a:fld>
             <a:endParaRPr lang="en-US"/>
           </a:p>
@@ -2942,7 +2946,7 @@
           <a:p>
             <a:fld id="{8FC04297-0A4E-4A07-84A0-4091E8BEFAFA}" type="datetimeFigureOut">
               <a:rPr lang="en-US" smtClean="0"/>
-              <a:t>6/28/2021</a:t>
+              <a:t>6/29/2021</a:t>
             </a:fld>
             <a:endParaRPr lang="en-US"/>
           </a:p>
@@ -3582,6 +3586,185 @@
             <p:ph type="title"/>
           </p:nvPr>
         </p:nvSpPr>
+        <p:spPr>
+          <a:xfrm>
+            <a:off x="838200" y="114661"/>
+            <a:ext cx="10515600" cy="1325563"/>
+          </a:xfrm>
+        </p:spPr>
+        <p:txBody>
+          <a:bodyPr>
+            <a:normAutofit/>
+          </a:bodyPr>
+          <a:lstStyle/>
+          <a:p>
+            <a:r>
+              <a:rPr lang="en-US" sz="3600" dirty="0"/>
+              <a:t>Select Countries: Egypt Breakdown by Object Type</a:t>
+            </a:r>
+          </a:p>
+        </p:txBody>
+      </p:sp>
+      <p:sp>
+        <p:nvSpPr>
+          <p:cNvPr id="4" name="Text Placeholder 3">
+            <a:extLst>
+              <a:ext uri="{FF2B5EF4-FFF2-40B4-BE49-F238E27FC236}">
+                <a16:creationId xmlns:a16="http://schemas.microsoft.com/office/drawing/2014/main" id="{B9A91CA8-FBE0-4977-B36B-6EF552F23B97}"/>
+              </a:ext>
+            </a:extLst>
+          </p:cNvPr>
+          <p:cNvSpPr>
+            <a:spLocks noGrp="1"/>
+          </p:cNvSpPr>
+          <p:nvPr>
+            <p:ph type="body" sz="quarter" idx="3"/>
+          </p:nvPr>
+        </p:nvSpPr>
+        <p:spPr>
+          <a:xfrm>
+            <a:off x="7078077" y="1440224"/>
+            <a:ext cx="5183188" cy="500928"/>
+          </a:xfrm>
+        </p:spPr>
+        <p:txBody>
+          <a:bodyPr/>
+          <a:lstStyle/>
+          <a:p>
+            <a:pPr algn="ctr"/>
+            <a:r>
+              <a:rPr lang="en-US" dirty="0"/>
+              <a:t>Egyptian Sculpture</a:t>
+            </a:r>
+          </a:p>
+        </p:txBody>
+      </p:sp>
+      <p:pic>
+        <p:nvPicPr>
+          <p:cNvPr id="13" name="Content Placeholder 12">
+            <a:extLst>
+              <a:ext uri="{FF2B5EF4-FFF2-40B4-BE49-F238E27FC236}">
+                <a16:creationId xmlns:a16="http://schemas.microsoft.com/office/drawing/2014/main" id="{21B6AEBE-CEE3-435E-9FA7-0E91A6707A31}"/>
+              </a:ext>
+            </a:extLst>
+          </p:cNvPr>
+          <p:cNvPicPr>
+            <a:picLocks noGrp="1" noChangeAspect="1"/>
+          </p:cNvPicPr>
+          <p:nvPr>
+            <p:ph sz="quarter" idx="4"/>
+          </p:nvPr>
+        </p:nvPicPr>
+        <p:blipFill>
+          <a:blip r:embed="rId2">
+            <a:extLst>
+              <a:ext uri="{28A0092B-C50C-407E-A947-70E740481C1C}">
+                <a14:useLocalDpi xmlns:a14="http://schemas.microsoft.com/office/drawing/2010/main" val="0"/>
+              </a:ext>
+            </a:extLst>
+          </a:blip>
+          <a:stretch>
+            <a:fillRect/>
+          </a:stretch>
+        </p:blipFill>
+        <p:spPr>
+          <a:xfrm>
+            <a:off x="8239760" y="2007824"/>
+            <a:ext cx="2859823" cy="4289198"/>
+          </a:xfrm>
+          <a:effectLst>
+            <a:softEdge rad="127000"/>
+          </a:effectLst>
+        </p:spPr>
+      </p:pic>
+      <p:pic>
+        <p:nvPicPr>
+          <p:cNvPr id="7" name="Content Placeholder 6">
+            <a:extLst>
+              <a:ext uri="{FF2B5EF4-FFF2-40B4-BE49-F238E27FC236}">
+                <a16:creationId xmlns:a16="http://schemas.microsoft.com/office/drawing/2014/main" id="{83984152-6450-4855-A3C8-FCBEEA8C6763}"/>
+              </a:ext>
+            </a:extLst>
+          </p:cNvPr>
+          <p:cNvPicPr>
+            <a:picLocks noGrp="1" noChangeAspect="1"/>
+          </p:cNvPicPr>
+          <p:nvPr>
+            <p:ph sz="half" idx="2"/>
+          </p:nvPr>
+        </p:nvPicPr>
+        <p:blipFill rotWithShape="1">
+          <a:blip r:embed="rId3">
+            <a:extLst>
+              <a:ext uri="{28A0092B-C50C-407E-A947-70E740481C1C}">
+                <a14:useLocalDpi xmlns:a14="http://schemas.microsoft.com/office/drawing/2010/main" val="0"/>
+              </a:ext>
+            </a:extLst>
+          </a:blip>
+          <a:srcRect l="19787" t="7290" b="15778"/>
+          <a:stretch/>
+        </p:blipFill>
+        <p:spPr>
+          <a:xfrm>
+            <a:off x="529437" y="1249680"/>
+            <a:ext cx="6802857" cy="5437170"/>
+          </a:xfrm>
+        </p:spPr>
+      </p:pic>
+    </p:spTree>
+    <p:extLst>
+      <p:ext uri="{BB962C8B-B14F-4D97-AF65-F5344CB8AC3E}">
+        <p14:creationId xmlns:p14="http://schemas.microsoft.com/office/powerpoint/2010/main" val="2015169826"/>
+      </p:ext>
+    </p:extLst>
+  </p:cSld>
+  <p:clrMapOvr>
+    <a:masterClrMapping/>
+  </p:clrMapOvr>
+</p:sld>
+</file>
+
+<file path=ppt/slides/slide11.xml><?xml version="1.0" encoding="utf-8"?>
+<p:sld xmlns:a="http://schemas.openxmlformats.org/drawingml/2006/main" xmlns:r="http://schemas.openxmlformats.org/officeDocument/2006/relationships" xmlns:p="http://schemas.openxmlformats.org/presentationml/2006/main">
+  <p:cSld>
+    <p:bg>
+      <p:bgPr>
+        <a:solidFill>
+          <a:schemeClr val="bg1"/>
+        </a:solidFill>
+        <a:effectLst/>
+      </p:bgPr>
+    </p:bg>
+    <p:spTree>
+      <p:nvGrpSpPr>
+        <p:cNvPr id="1" name=""/>
+        <p:cNvGrpSpPr/>
+        <p:nvPr/>
+      </p:nvGrpSpPr>
+      <p:grpSpPr>
+        <a:xfrm>
+          <a:off x="0" y="0"/>
+          <a:ext cx="0" cy="0"/>
+          <a:chOff x="0" y="0"/>
+          <a:chExt cx="0" cy="0"/>
+        </a:xfrm>
+      </p:grpSpPr>
+      <p:sp>
+        <p:nvSpPr>
+          <p:cNvPr id="2" name="Title 1">
+            <a:extLst>
+              <a:ext uri="{FF2B5EF4-FFF2-40B4-BE49-F238E27FC236}">
+                <a16:creationId xmlns:a16="http://schemas.microsoft.com/office/drawing/2014/main" id="{555D1F26-F171-4F89-9348-D8380221C40B}"/>
+              </a:ext>
+            </a:extLst>
+          </p:cNvPr>
+          <p:cNvSpPr>
+            <a:spLocks noGrp="1"/>
+          </p:cNvSpPr>
+          <p:nvPr>
+            <p:ph type="title"/>
+          </p:nvPr>
+        </p:nvSpPr>
         <p:spPr/>
         <p:txBody>
           <a:bodyPr>
@@ -3715,7 +3898,7 @@
 </p:sld>
 </file>
 
-<file path=ppt/slides/slide11.xml><?xml version="1.0" encoding="utf-8"?>
+<file path=ppt/slides/slide12.xml><?xml version="1.0" encoding="utf-8"?>
 <p:sld xmlns:a="http://schemas.openxmlformats.org/drawingml/2006/main" xmlns:r="http://schemas.openxmlformats.org/officeDocument/2006/relationships" xmlns:p="http://schemas.openxmlformats.org/presentationml/2006/main">
   <p:cSld>
     <p:bg>
@@ -3844,7 +4027,7 @@
 </p:sld>
 </file>
 
-<file path=ppt/slides/slide12.xml><?xml version="1.0" encoding="utf-8"?>
+<file path=ppt/slides/slide13.xml><?xml version="1.0" encoding="utf-8"?>
 <p:sld xmlns:a="http://schemas.openxmlformats.org/drawingml/2006/main" xmlns:r="http://schemas.openxmlformats.org/officeDocument/2006/relationships" xmlns:p="http://schemas.openxmlformats.org/presentationml/2006/main">
   <p:cSld>
     <p:bg>
@@ -4143,7 +4326,7 @@
 </p:sld>
 </file>
 
-<file path=ppt/slides/slide13.xml><?xml version="1.0" encoding="utf-8"?>
+<file path=ppt/slides/slide14.xml><?xml version="1.0" encoding="utf-8"?>
 <p:sld xmlns:a="http://schemas.openxmlformats.org/drawingml/2006/main" xmlns:r="http://schemas.openxmlformats.org/officeDocument/2006/relationships" xmlns:p="http://schemas.openxmlformats.org/presentationml/2006/main">
   <p:cSld>
     <p:bg>
@@ -4267,6 +4450,21 @@
             </a:r>
           </a:p>
           <a:p>
+            <a:pPr lvl="1"/>
+            <a:r>
+              <a:rPr lang="en-US" b="1" dirty="0">
+                <a:effectLst>
+                  <a:outerShdw blurRad="38100" dist="38100" dir="2700000" algn="tl">
+                    <a:srgbClr val="000000">
+                      <a:alpha val="43137"/>
+                    </a:srgbClr>
+                  </a:outerShdw>
+                </a:effectLst>
+              </a:rPr>
+              <a:t>5,303 of those individuals were for outside the US (15%)</a:t>
+            </a:r>
+          </a:p>
+          <a:p>
             <a:r>
               <a:rPr lang="en-US" b="1" dirty="0">
                 <a:effectLst>
@@ -4322,7 +4520,7 @@
                   </a:outerShdw>
                 </a:effectLst>
               </a:rPr>
-              <a:t>79% was from the largest historical benefactor Jefferson R. Burdick</a:t>
+              <a:t>79% was from the largest historical benefactor Jefferson R. Burdick (37,002)</a:t>
             </a:r>
           </a:p>
           <a:p>
@@ -4337,7 +4535,7 @@
                   </a:outerShdw>
                 </a:effectLst>
               </a:rPr>
-              <a:t>Median number of objects gifted is 1457</a:t>
+              <a:t>Median number of objects gifted for collectors is 1,457</a:t>
             </a:r>
           </a:p>
         </p:txBody>
@@ -4593,7 +4791,760 @@
 </p:sld>
 </file>
 
+<file path=ppt/slides/slide15.xml><?xml version="1.0" encoding="utf-8"?>
+<p:sld xmlns:a="http://schemas.openxmlformats.org/drawingml/2006/main" xmlns:r="http://schemas.openxmlformats.org/officeDocument/2006/relationships" xmlns:p="http://schemas.openxmlformats.org/presentationml/2006/main">
+  <p:cSld>
+    <p:bg>
+      <p:bgPr>
+        <a:solidFill>
+          <a:schemeClr val="bg1"/>
+        </a:solidFill>
+        <a:effectLst/>
+      </p:bgPr>
+    </p:bg>
+    <p:spTree>
+      <p:nvGrpSpPr>
+        <p:cNvPr id="1" name=""/>
+        <p:cNvGrpSpPr/>
+        <p:nvPr/>
+      </p:nvGrpSpPr>
+      <p:grpSpPr>
+        <a:xfrm>
+          <a:off x="0" y="0"/>
+          <a:ext cx="0" cy="0"/>
+          <a:chOff x="0" y="0"/>
+          <a:chExt cx="0" cy="0"/>
+        </a:xfrm>
+      </p:grpSpPr>
+      <p:sp>
+        <p:nvSpPr>
+          <p:cNvPr id="2" name="Title 1">
+            <a:extLst>
+              <a:ext uri="{FF2B5EF4-FFF2-40B4-BE49-F238E27FC236}">
+                <a16:creationId xmlns:a16="http://schemas.microsoft.com/office/drawing/2014/main" id="{0F0FA6B8-37B1-4206-9F77-50416EF4A783}"/>
+              </a:ext>
+            </a:extLst>
+          </p:cNvPr>
+          <p:cNvSpPr>
+            <a:spLocks noGrp="1"/>
+          </p:cNvSpPr>
+          <p:nvPr>
+            <p:ph type="title"/>
+          </p:nvPr>
+        </p:nvSpPr>
+        <p:spPr/>
+        <p:txBody>
+          <a:bodyPr/>
+          <a:lstStyle/>
+          <a:p>
+            <a:pPr algn="ctr"/>
+            <a:r>
+              <a:rPr lang="en-US" b="1" dirty="0">
+                <a:solidFill>
+                  <a:schemeClr val="tx1">
+                    <a:lumMod val="95000"/>
+                    <a:lumOff val="5000"/>
+                  </a:schemeClr>
+                </a:solidFill>
+                <a:effectLst>
+                  <a:outerShdw blurRad="38100" dist="38100" dir="2700000" algn="tl">
+                    <a:srgbClr val="000000">
+                      <a:alpha val="43137"/>
+                    </a:srgbClr>
+                  </a:outerShdw>
+                </a:effectLst>
+              </a:rPr>
+              <a:t>Process</a:t>
+            </a:r>
+          </a:p>
+        </p:txBody>
+      </p:sp>
+      <p:sp>
+        <p:nvSpPr>
+          <p:cNvPr id="3" name="Content Placeholder 2">
+            <a:extLst>
+              <a:ext uri="{FF2B5EF4-FFF2-40B4-BE49-F238E27FC236}">
+                <a16:creationId xmlns:a16="http://schemas.microsoft.com/office/drawing/2014/main" id="{AE22665A-046C-4AD3-A007-D523B27BF7CC}"/>
+              </a:ext>
+            </a:extLst>
+          </p:cNvPr>
+          <p:cNvSpPr>
+            <a:spLocks noGrp="1"/>
+          </p:cNvSpPr>
+          <p:nvPr>
+            <p:ph idx="1"/>
+          </p:nvPr>
+        </p:nvSpPr>
+        <p:spPr/>
+        <p:txBody>
+          <a:bodyPr/>
+          <a:lstStyle/>
+          <a:p>
+            <a:r>
+              <a:rPr lang="en-US" dirty="0"/>
+              <a:t>Reduced data set to top 25 classifications from 1194</a:t>
+            </a:r>
+          </a:p>
+          <a:p>
+            <a:r>
+              <a:rPr lang="en-US" dirty="0"/>
+              <a:t>Cleaned data </a:t>
+            </a:r>
+          </a:p>
+          <a:p>
+            <a:pPr lvl="1"/>
+            <a:r>
+              <a:rPr lang="en-US" dirty="0"/>
+              <a:t>Removed culture references containing probably, possibly, unknown for cultural evaluation</a:t>
+            </a:r>
+          </a:p>
+          <a:p>
+            <a:r>
+              <a:rPr lang="en-US" dirty="0"/>
+              <a:t>Added additional geographical data (</a:t>
+            </a:r>
+            <a:r>
+              <a:rPr lang="en-US" dirty="0" err="1"/>
+              <a:t>lat,lon</a:t>
+            </a:r>
+            <a:r>
+              <a:rPr lang="en-US" dirty="0"/>
+              <a:t>) for mapping</a:t>
+            </a:r>
+          </a:p>
+          <a:p>
+            <a:r>
+              <a:rPr lang="en-US" dirty="0"/>
+              <a:t>Refined visualizations for a more representative range of collector donations</a:t>
+            </a:r>
+          </a:p>
+          <a:p>
+            <a:r>
+              <a:rPr lang="en-US" dirty="0"/>
+              <a:t>Conducted summary statistics of dataset to generate informative insight</a:t>
+            </a:r>
+          </a:p>
+        </p:txBody>
+      </p:sp>
+    </p:spTree>
+    <p:extLst>
+      <p:ext uri="{BB962C8B-B14F-4D97-AF65-F5344CB8AC3E}">
+        <p14:creationId xmlns:p14="http://schemas.microsoft.com/office/powerpoint/2010/main" val="439698636"/>
+      </p:ext>
+    </p:extLst>
+  </p:cSld>
+  <p:clrMapOvr>
+    <a:masterClrMapping/>
+  </p:clrMapOvr>
+</p:sld>
+</file>
+
+<file path=ppt/slides/slide16.xml><?xml version="1.0" encoding="utf-8"?>
+<p:sld xmlns:a="http://schemas.openxmlformats.org/drawingml/2006/main" xmlns:r="http://schemas.openxmlformats.org/officeDocument/2006/relationships" xmlns:p="http://schemas.openxmlformats.org/presentationml/2006/main">
+  <p:cSld>
+    <p:bg>
+      <p:bgPr>
+        <a:solidFill>
+          <a:srgbClr val="CCCCFF"/>
+        </a:solidFill>
+        <a:effectLst/>
+      </p:bgPr>
+    </p:bg>
+    <p:spTree>
+      <p:nvGrpSpPr>
+        <p:cNvPr id="1" name=""/>
+        <p:cNvGrpSpPr/>
+        <p:nvPr/>
+      </p:nvGrpSpPr>
+      <p:grpSpPr>
+        <a:xfrm>
+          <a:off x="0" y="0"/>
+          <a:ext cx="0" cy="0"/>
+          <a:chOff x="0" y="0"/>
+          <a:chExt cx="0" cy="0"/>
+        </a:xfrm>
+      </p:grpSpPr>
+      <p:sp>
+        <p:nvSpPr>
+          <p:cNvPr id="2" name="Title 1">
+            <a:extLst>
+              <a:ext uri="{FF2B5EF4-FFF2-40B4-BE49-F238E27FC236}">
+                <a16:creationId xmlns:a16="http://schemas.microsoft.com/office/drawing/2014/main" id="{23A4F98E-AE8A-4EE5-9690-89F9FDAD946B}"/>
+              </a:ext>
+            </a:extLst>
+          </p:cNvPr>
+          <p:cNvSpPr>
+            <a:spLocks noGrp="1"/>
+          </p:cNvSpPr>
+          <p:nvPr>
+            <p:ph type="title"/>
+          </p:nvPr>
+        </p:nvSpPr>
+        <p:spPr>
+          <a:xfrm>
+            <a:off x="838200" y="1007382"/>
+            <a:ext cx="10515600" cy="5654675"/>
+          </a:xfrm>
+        </p:spPr>
+        <p:txBody>
+          <a:bodyPr>
+            <a:normAutofit/>
+          </a:bodyPr>
+          <a:lstStyle/>
+          <a:p>
+            <a:pPr algn="ctr"/>
+            <a:r>
+              <a:rPr lang="en-US" b="1" dirty="0">
+                <a:effectLst>
+                  <a:outerShdw blurRad="38100" dist="38100" dir="2700000" algn="tl">
+                    <a:srgbClr val="000000">
+                      <a:alpha val="43137"/>
+                    </a:srgbClr>
+                  </a:outerShdw>
+                </a:effectLst>
+              </a:rPr>
+              <a:t>Thank you for taking the time today to learn more about the Met</a:t>
+            </a:r>
+            <a:br>
+              <a:rPr lang="en-US" b="1" dirty="0">
+                <a:effectLst>
+                  <a:outerShdw blurRad="38100" dist="38100" dir="2700000" algn="tl">
+                    <a:srgbClr val="000000">
+                      <a:alpha val="43137"/>
+                    </a:srgbClr>
+                  </a:outerShdw>
+                </a:effectLst>
+              </a:rPr>
+            </a:br>
+            <a:br>
+              <a:rPr lang="en-US" b="1" dirty="0">
+                <a:effectLst>
+                  <a:outerShdw blurRad="38100" dist="38100" dir="2700000" algn="tl">
+                    <a:srgbClr val="000000">
+                      <a:alpha val="43137"/>
+                    </a:srgbClr>
+                  </a:outerShdw>
+                </a:effectLst>
+              </a:rPr>
+            </a:br>
+            <a:r>
+              <a:rPr lang="en-US" b="1" dirty="0">
+                <a:effectLst>
+                  <a:outerShdw blurRad="38100" dist="38100" dir="2700000" algn="tl">
+                    <a:srgbClr val="000000">
+                      <a:alpha val="43137"/>
+                    </a:srgbClr>
+                  </a:outerShdw>
+                </a:effectLst>
+              </a:rPr>
+              <a:t>Does anyone have questions?</a:t>
+            </a:r>
+            <a:br>
+              <a:rPr lang="en-US" b="1" dirty="0">
+                <a:effectLst>
+                  <a:outerShdw blurRad="38100" dist="38100" dir="2700000" algn="tl">
+                    <a:srgbClr val="000000">
+                      <a:alpha val="43137"/>
+                    </a:srgbClr>
+                  </a:outerShdw>
+                </a:effectLst>
+              </a:rPr>
+            </a:br>
+            <a:br>
+              <a:rPr lang="en-US" b="1" dirty="0">
+                <a:effectLst>
+                  <a:outerShdw blurRad="38100" dist="38100" dir="2700000" algn="tl">
+                    <a:srgbClr val="000000">
+                      <a:alpha val="43137"/>
+                    </a:srgbClr>
+                  </a:outerShdw>
+                </a:effectLst>
+              </a:rPr>
+            </a:br>
+            <a:br>
+              <a:rPr lang="en-US" b="1" dirty="0">
+                <a:effectLst>
+                  <a:outerShdw blurRad="38100" dist="38100" dir="2700000" algn="tl">
+                    <a:srgbClr val="000000">
+                      <a:alpha val="43137"/>
+                    </a:srgbClr>
+                  </a:outerShdw>
+                </a:effectLst>
+              </a:rPr>
+            </a:br>
+            <a:br>
+              <a:rPr lang="en-US" b="1" dirty="0">
+                <a:effectLst>
+                  <a:outerShdw blurRad="38100" dist="38100" dir="2700000" algn="tl">
+                    <a:srgbClr val="000000">
+                      <a:alpha val="43137"/>
+                    </a:srgbClr>
+                  </a:outerShdw>
+                </a:effectLst>
+              </a:rPr>
+            </a:br>
+            <a:r>
+              <a:rPr lang="en-US" sz="2000" b="1" dirty="0">
+                <a:effectLst>
+                  <a:outerShdw blurRad="38100" dist="38100" dir="2700000" algn="tl">
+                    <a:srgbClr val="000000">
+                      <a:alpha val="43137"/>
+                    </a:srgbClr>
+                  </a:outerShdw>
+                </a:effectLst>
+              </a:rPr>
+              <a:t>A special thank you to the University of Denver and Kevin Lee for the knowledge they have shared</a:t>
+            </a:r>
+            <a:br>
+              <a:rPr lang="en-US" sz="2000" b="1" dirty="0">
+                <a:effectLst>
+                  <a:outerShdw blurRad="38100" dist="38100" dir="2700000" algn="tl">
+                    <a:srgbClr val="000000">
+                      <a:alpha val="43137"/>
+                    </a:srgbClr>
+                  </a:outerShdw>
+                </a:effectLst>
+              </a:rPr>
+            </a:br>
+            <a:r>
+              <a:rPr lang="en-US" sz="2000" b="1" dirty="0">
+                <a:effectLst>
+                  <a:outerShdw blurRad="38100" dist="38100" dir="2700000" algn="tl">
+                    <a:srgbClr val="000000">
+                      <a:alpha val="43137"/>
+                    </a:srgbClr>
+                  </a:outerShdw>
+                </a:effectLst>
+              </a:rPr>
+              <a:t>(a truly wonderful gift)</a:t>
+            </a:r>
+          </a:p>
+        </p:txBody>
+      </p:sp>
+    </p:spTree>
+    <p:extLst>
+      <p:ext uri="{BB962C8B-B14F-4D97-AF65-F5344CB8AC3E}">
+        <p14:creationId xmlns:p14="http://schemas.microsoft.com/office/powerpoint/2010/main" val="690195502"/>
+      </p:ext>
+    </p:extLst>
+  </p:cSld>
+  <p:clrMapOvr>
+    <a:masterClrMapping/>
+  </p:clrMapOvr>
+</p:sld>
+</file>
+
+<file path=ppt/slides/slide17.xml><?xml version="1.0" encoding="utf-8"?>
+<p:sld xmlns:a="http://schemas.openxmlformats.org/drawingml/2006/main" xmlns:r="http://schemas.openxmlformats.org/officeDocument/2006/relationships" xmlns:p="http://schemas.openxmlformats.org/presentationml/2006/main">
+  <p:cSld>
+    <p:bg>
+      <p:bgPr>
+        <a:solidFill>
+          <a:srgbClr val="406AC8"/>
+        </a:solidFill>
+        <a:effectLst/>
+      </p:bgPr>
+    </p:bg>
+    <p:spTree>
+      <p:nvGrpSpPr>
+        <p:cNvPr id="1" name=""/>
+        <p:cNvGrpSpPr/>
+        <p:nvPr/>
+      </p:nvGrpSpPr>
+      <p:grpSpPr>
+        <a:xfrm>
+          <a:off x="0" y="0"/>
+          <a:ext cx="0" cy="0"/>
+          <a:chOff x="0" y="0"/>
+          <a:chExt cx="0" cy="0"/>
+        </a:xfrm>
+      </p:grpSpPr>
+      <p:sp>
+        <p:nvSpPr>
+          <p:cNvPr id="2" name="Title 1">
+            <a:extLst>
+              <a:ext uri="{FF2B5EF4-FFF2-40B4-BE49-F238E27FC236}">
+                <a16:creationId xmlns:a16="http://schemas.microsoft.com/office/drawing/2014/main" id="{CBF9F169-3F09-4D3B-AF6F-964FD96C0361}"/>
+              </a:ext>
+            </a:extLst>
+          </p:cNvPr>
+          <p:cNvSpPr>
+            <a:spLocks noGrp="1"/>
+          </p:cNvSpPr>
+          <p:nvPr>
+            <p:ph type="title"/>
+          </p:nvPr>
+        </p:nvSpPr>
+        <p:spPr/>
+        <p:txBody>
+          <a:bodyPr/>
+          <a:lstStyle/>
+          <a:p>
+            <a:pPr algn="ctr"/>
+            <a:r>
+              <a:rPr lang="en-US" b="1" dirty="0">
+                <a:effectLst>
+                  <a:outerShdw blurRad="38100" dist="38100" dir="2700000" algn="tl">
+                    <a:srgbClr val="000000">
+                      <a:alpha val="43137"/>
+                    </a:srgbClr>
+                  </a:outerShdw>
+                </a:effectLst>
+              </a:rPr>
+              <a:t>Thomas (TJ) Ossola</a:t>
+            </a:r>
+          </a:p>
+        </p:txBody>
+      </p:sp>
+      <p:sp>
+        <p:nvSpPr>
+          <p:cNvPr id="3" name="Content Placeholder 2">
+            <a:extLst>
+              <a:ext uri="{FF2B5EF4-FFF2-40B4-BE49-F238E27FC236}">
+                <a16:creationId xmlns:a16="http://schemas.microsoft.com/office/drawing/2014/main" id="{74AD50B4-134F-4DEE-979D-8D9BD9407F2E}"/>
+              </a:ext>
+            </a:extLst>
+          </p:cNvPr>
+          <p:cNvSpPr>
+            <a:spLocks noGrp="1"/>
+          </p:cNvSpPr>
+          <p:nvPr>
+            <p:ph idx="1"/>
+          </p:nvPr>
+        </p:nvSpPr>
+        <p:spPr>
+          <a:xfrm>
+            <a:off x="838200" y="1426029"/>
+            <a:ext cx="10515600" cy="4750934"/>
+          </a:xfrm>
+        </p:spPr>
+        <p:txBody>
+          <a:bodyPr/>
+          <a:lstStyle/>
+          <a:p>
+            <a:pPr marL="0" indent="0" algn="ctr">
+              <a:buNone/>
+            </a:pPr>
+            <a:r>
+              <a:rPr lang="en-US" dirty="0"/>
+              <a:t>Glenwood Springs CO </a:t>
+            </a:r>
+          </a:p>
+          <a:p>
+            <a:pPr marL="0" indent="0" algn="ctr">
+              <a:buNone/>
+            </a:pPr>
+            <a:r>
+              <a:rPr lang="en-US" dirty="0"/>
+              <a:t>970.274.0980</a:t>
+            </a:r>
+          </a:p>
+          <a:p>
+            <a:pPr marL="0" indent="0" algn="ctr">
+              <a:buNone/>
+            </a:pPr>
+            <a:endParaRPr lang="en-US" dirty="0"/>
+          </a:p>
+          <a:p>
+            <a:pPr marL="0" indent="0" algn="ctr">
+              <a:buNone/>
+            </a:pPr>
+            <a:r>
+              <a:rPr lang="en-US" dirty="0"/>
+              <a:t>Email:</a:t>
+            </a:r>
+          </a:p>
+          <a:p>
+            <a:pPr marL="0" indent="0" algn="ctr">
+              <a:buNone/>
+            </a:pPr>
+            <a:r>
+              <a:rPr lang="en-US" dirty="0"/>
+              <a:t>tj@solvingaesthetics.com</a:t>
+            </a:r>
+          </a:p>
+          <a:p>
+            <a:pPr marL="0" indent="0" algn="ctr">
+              <a:buNone/>
+            </a:pPr>
+            <a:r>
+              <a:rPr lang="en-US" dirty="0"/>
+              <a:t>Linkedin:</a:t>
+            </a:r>
+          </a:p>
+          <a:p>
+            <a:pPr marL="0" indent="0" algn="ctr">
+              <a:buNone/>
+            </a:pPr>
+            <a:r>
+              <a:rPr lang="en-US" i="0" u="none" strike="noStrike" dirty="0">
+                <a:effectLst/>
+                <a:latin typeface="-apple-system"/>
+              </a:rPr>
+              <a:t>linkedin.com/in/tj-ossola-173433148</a:t>
+            </a:r>
+          </a:p>
+          <a:p>
+            <a:pPr marL="0" indent="0" algn="ctr">
+              <a:buNone/>
+            </a:pPr>
+            <a:r>
+              <a:rPr lang="en-US" dirty="0">
+                <a:latin typeface="-apple-system"/>
+              </a:rPr>
+              <a:t>GitHub:</a:t>
+            </a:r>
+          </a:p>
+          <a:p>
+            <a:pPr marL="0" indent="0" algn="ctr">
+              <a:buNone/>
+            </a:pPr>
+            <a:r>
+              <a:rPr lang="en-US" dirty="0">
+                <a:latin typeface="-apple-system"/>
+              </a:rPr>
+              <a:t>https://github.com/MtSopris</a:t>
+            </a:r>
+            <a:endParaRPr lang="en-US" dirty="0"/>
+          </a:p>
+        </p:txBody>
+      </p:sp>
+    </p:spTree>
+    <p:extLst>
+      <p:ext uri="{BB962C8B-B14F-4D97-AF65-F5344CB8AC3E}">
+        <p14:creationId xmlns:p14="http://schemas.microsoft.com/office/powerpoint/2010/main" val="105889871"/>
+      </p:ext>
+    </p:extLst>
+  </p:cSld>
+  <p:clrMapOvr>
+    <a:masterClrMapping/>
+  </p:clrMapOvr>
+</p:sld>
+</file>
+
 <file path=ppt/slides/slide2.xml><?xml version="1.0" encoding="utf-8"?>
+<p:sld xmlns:a="http://schemas.openxmlformats.org/drawingml/2006/main" xmlns:r="http://schemas.openxmlformats.org/officeDocument/2006/relationships" xmlns:p="http://schemas.openxmlformats.org/presentationml/2006/main">
+  <p:cSld>
+    <p:bg>
+      <p:bgPr>
+        <a:blipFill dpi="0" rotWithShape="1">
+          <a:blip r:embed="rId2">
+            <a:alphaModFix amt="44000"/>
+            <a:lum/>
+          </a:blip>
+          <a:srcRect/>
+          <a:stretch>
+            <a:fillRect t="-10000" b="-10000"/>
+          </a:stretch>
+        </a:blipFill>
+        <a:effectLst/>
+      </p:bgPr>
+    </p:bg>
+    <p:spTree>
+      <p:nvGrpSpPr>
+        <p:cNvPr id="1" name=""/>
+        <p:cNvGrpSpPr/>
+        <p:nvPr/>
+      </p:nvGrpSpPr>
+      <p:grpSpPr>
+        <a:xfrm>
+          <a:off x="0" y="0"/>
+          <a:ext cx="0" cy="0"/>
+          <a:chOff x="0" y="0"/>
+          <a:chExt cx="0" cy="0"/>
+        </a:xfrm>
+      </p:grpSpPr>
+      <p:sp>
+        <p:nvSpPr>
+          <p:cNvPr id="2" name="Title 1">
+            <a:extLst>
+              <a:ext uri="{FF2B5EF4-FFF2-40B4-BE49-F238E27FC236}">
+                <a16:creationId xmlns:a16="http://schemas.microsoft.com/office/drawing/2014/main" id="{9B76CD66-3FCC-457E-9704-B9CA9B9CB049}"/>
+              </a:ext>
+            </a:extLst>
+          </p:cNvPr>
+          <p:cNvSpPr>
+            <a:spLocks noGrp="1"/>
+          </p:cNvSpPr>
+          <p:nvPr>
+            <p:ph type="title"/>
+          </p:nvPr>
+        </p:nvSpPr>
+        <p:spPr/>
+        <p:txBody>
+          <a:bodyPr/>
+          <a:lstStyle/>
+          <a:p>
+            <a:endParaRPr lang="en-US" dirty="0"/>
+          </a:p>
+        </p:txBody>
+      </p:sp>
+      <p:sp>
+        <p:nvSpPr>
+          <p:cNvPr id="3" name="Content Placeholder 2">
+            <a:extLst>
+              <a:ext uri="{FF2B5EF4-FFF2-40B4-BE49-F238E27FC236}">
+                <a16:creationId xmlns:a16="http://schemas.microsoft.com/office/drawing/2014/main" id="{C0074B86-735A-4E2A-BEDA-6E3B76DFAEA3}"/>
+              </a:ext>
+            </a:extLst>
+          </p:cNvPr>
+          <p:cNvSpPr>
+            <a:spLocks noGrp="1"/>
+          </p:cNvSpPr>
+          <p:nvPr>
+            <p:ph idx="1"/>
+          </p:nvPr>
+        </p:nvSpPr>
+        <p:spPr>
+          <a:xfrm>
+            <a:off x="838200" y="2786742"/>
+            <a:ext cx="7913914" cy="3842657"/>
+          </a:xfrm>
+        </p:spPr>
+        <p:txBody>
+          <a:bodyPr>
+            <a:normAutofit/>
+          </a:bodyPr>
+          <a:lstStyle/>
+          <a:p>
+            <a:r>
+              <a:rPr lang="en-US" b="1" dirty="0">
+                <a:effectLst>
+                  <a:outerShdw blurRad="38100" dist="38100" dir="2700000" algn="tl">
+                    <a:srgbClr val="000000">
+                      <a:alpha val="43137"/>
+                    </a:srgbClr>
+                  </a:outerShdw>
+                </a:effectLst>
+              </a:rPr>
+              <a:t>What does the Met collection consist of? </a:t>
+            </a:r>
+          </a:p>
+          <a:p>
+            <a:pPr lvl="1"/>
+            <a:r>
+              <a:rPr lang="en-US" b="1" dirty="0">
+                <a:effectLst>
+                  <a:outerShdw blurRad="38100" dist="38100" dir="2700000" algn="tl">
+                    <a:srgbClr val="000000">
+                      <a:alpha val="43137"/>
+                    </a:srgbClr>
+                  </a:outerShdw>
+                </a:effectLst>
+              </a:rPr>
+              <a:t>Why visit?</a:t>
+            </a:r>
+          </a:p>
+          <a:p>
+            <a:r>
+              <a:rPr lang="en-US" b="1" dirty="0">
+                <a:effectLst>
+                  <a:outerShdw blurRad="38100" dist="38100" dir="2700000" algn="tl">
+                    <a:srgbClr val="000000">
+                      <a:alpha val="43137"/>
+                    </a:srgbClr>
+                  </a:outerShdw>
+                </a:effectLst>
+              </a:rPr>
+              <a:t>How has this collection come to it’s current state?</a:t>
+            </a:r>
+          </a:p>
+          <a:p>
+            <a:r>
+              <a:rPr lang="en-US" b="1" dirty="0">
+                <a:effectLst>
+                  <a:outerShdw blurRad="38100" dist="38100" dir="2700000" algn="tl">
+                    <a:srgbClr val="000000">
+                      <a:alpha val="43137"/>
+                    </a:srgbClr>
+                  </a:outerShdw>
+                </a:effectLst>
+              </a:rPr>
+              <a:t>What does analyzing the collection tell us about the museum?</a:t>
+            </a:r>
+          </a:p>
+          <a:p>
+            <a:r>
+              <a:rPr lang="en-US" b="1" dirty="0">
+                <a:effectLst>
+                  <a:outerShdw blurRad="38100" dist="38100" dir="2700000" algn="tl">
+                    <a:srgbClr val="000000">
+                      <a:alpha val="43137"/>
+                    </a:srgbClr>
+                  </a:outerShdw>
+                </a:effectLst>
+              </a:rPr>
+              <a:t>The subject of the dataset is industry agnostic</a:t>
+            </a:r>
+          </a:p>
+          <a:p>
+            <a:r>
+              <a:rPr lang="en-US" b="1" dirty="0">
+                <a:effectLst>
+                  <a:outerShdw blurRad="38100" dist="38100" dir="2700000" algn="tl">
+                    <a:srgbClr val="000000">
+                      <a:alpha val="43137"/>
+                    </a:srgbClr>
+                  </a:outerShdw>
+                </a:effectLst>
+              </a:rPr>
+              <a:t>The data is inconsistent creating unique challenges</a:t>
+            </a:r>
+          </a:p>
+          <a:p>
+            <a:r>
+              <a:rPr lang="en-US" b="1" dirty="0">
+                <a:effectLst>
+                  <a:outerShdw blurRad="38100" dist="38100" dir="2700000" algn="tl">
+                    <a:srgbClr val="000000">
+                      <a:alpha val="43137"/>
+                    </a:srgbClr>
+                  </a:outerShdw>
+                </a:effectLst>
+              </a:rPr>
+              <a:t>Personal passion for art</a:t>
+            </a:r>
+            <a:r>
+              <a:rPr lang="en-US" b="1">
+                <a:effectLst>
+                  <a:outerShdw blurRad="38100" dist="38100" dir="2700000" algn="tl">
+                    <a:srgbClr val="000000">
+                      <a:alpha val="43137"/>
+                    </a:srgbClr>
+                  </a:outerShdw>
+                </a:effectLst>
+              </a:rPr>
+              <a:t>, science, </a:t>
+            </a:r>
+            <a:r>
+              <a:rPr lang="en-US" b="1" dirty="0">
+                <a:effectLst>
+                  <a:outerShdw blurRad="38100" dist="38100" dir="2700000" algn="tl">
+                    <a:srgbClr val="000000">
+                      <a:alpha val="43137"/>
+                    </a:srgbClr>
+                  </a:outerShdw>
+                </a:effectLst>
+              </a:rPr>
+              <a:t>and history</a:t>
+            </a:r>
+          </a:p>
+        </p:txBody>
+      </p:sp>
+    </p:spTree>
+    <p:extLst>
+      <p:ext uri="{BB962C8B-B14F-4D97-AF65-F5344CB8AC3E}">
+        <p14:creationId xmlns:p14="http://schemas.microsoft.com/office/powerpoint/2010/main" val="1388415531"/>
+      </p:ext>
+    </p:extLst>
+  </p:cSld>
+  <p:clrMapOvr>
+    <a:masterClrMapping/>
+  </p:clrMapOvr>
+</p:sld>
+</file>
+
+<file path=ppt/slides/slide3.xml><?xml version="1.0" encoding="utf-8"?>
 <p:sld xmlns:a="http://schemas.openxmlformats.org/drawingml/2006/main" xmlns:r="http://schemas.openxmlformats.org/officeDocument/2006/relationships" xmlns:p="http://schemas.openxmlformats.org/presentationml/2006/main">
   <p:cSld>
     <p:bg>
@@ -4762,7 +5713,7 @@
 </p:sld>
 </file>
 
-<file path=ppt/slides/slide3.xml><?xml version="1.0" encoding="utf-8"?>
+<file path=ppt/slides/slide4.xml><?xml version="1.0" encoding="utf-8"?>
 <p:sld xmlns:a="http://schemas.openxmlformats.org/drawingml/2006/main" xmlns:r="http://schemas.openxmlformats.org/officeDocument/2006/relationships" xmlns:p="http://schemas.openxmlformats.org/presentationml/2006/main">
   <p:cSld>
     <p:bg>
@@ -4933,7 +5884,7 @@
 </p:sld>
 </file>
 
-<file path=ppt/slides/slide4.xml><?xml version="1.0" encoding="utf-8"?>
+<file path=ppt/slides/slide5.xml><?xml version="1.0" encoding="utf-8"?>
 <p:sld xmlns:a="http://schemas.openxmlformats.org/drawingml/2006/main" xmlns:r="http://schemas.openxmlformats.org/officeDocument/2006/relationships" xmlns:p="http://schemas.openxmlformats.org/presentationml/2006/main">
   <p:cSld>
     <p:bg>
@@ -5157,7 +6108,7 @@
           <p:nvPr>
             <p:extLst>
               <p:ext uri="{D42A27DB-BD31-4B8C-83A1-F6EECF244321}">
-                <p14:modId xmlns:p14="http://schemas.microsoft.com/office/powerpoint/2010/main" val="3746028280"/>
+                <p14:modId xmlns:p14="http://schemas.microsoft.com/office/powerpoint/2010/main" val="2684773523"/>
               </p:ext>
             </p:extLst>
           </p:nvPr>
@@ -5472,9 +6423,18 @@
                     <a:lstStyle/>
                     <a:p>
                       <a:r>
-                        <a:rPr lang="en-US" sz="2000" b="1" dirty="0"/>
-                        <a:t>4,302</a:t>
+                        <a:rPr lang="en-US" sz="2000" b="1" dirty="0">
+                          <a:effectLst>
+                            <a:outerShdw blurRad="38100" dist="38100" dir="2700000" algn="tl">
+                              <a:srgbClr val="000000">
+                                <a:alpha val="43137"/>
+                              </a:srgbClr>
+                            </a:outerShdw>
+                          </a:effectLst>
+                        </a:rPr>
+                        <a:t>35,124</a:t>
                       </a:r>
+                      <a:endParaRPr lang="en-US" sz="2000" b="1" dirty="0"/>
                     </a:p>
                   </a:txBody>
                   <a:tcPr/>
@@ -5502,7 +6462,7 @@
 </p:sld>
 </file>
 
-<file path=ppt/slides/slide5.xml><?xml version="1.0" encoding="utf-8"?>
+<file path=ppt/slides/slide6.xml><?xml version="1.0" encoding="utf-8"?>
 <p:sld xmlns:a="http://schemas.openxmlformats.org/drawingml/2006/main" xmlns:r="http://schemas.openxmlformats.org/officeDocument/2006/relationships" xmlns:p="http://schemas.openxmlformats.org/presentationml/2006/main">
   <p:cSld>
     <p:bg>
@@ -5560,6 +6520,7 @@
           <a:bodyPr/>
           <a:lstStyle/>
           <a:p>
+            <a:pPr algn="ctr"/>
             <a:r>
               <a:rPr lang="en-US" b="1" dirty="0"/>
               <a:t>Top Object by Culture and Classification</a:t>
@@ -5628,7 +6589,7 @@
             </a:pPr>
             <a:r>
               <a:rPr lang="en-US" sz="1000" dirty="0"/>
-              <a:t>									         (United States removed for scaling)</a:t>
+              <a:t>									</a:t>
             </a:r>
           </a:p>
         </p:txBody>
@@ -5660,7 +6621,7 @@
         </p:blipFill>
         <p:spPr>
           <a:xfrm>
-            <a:off x="609600" y="1158716"/>
+            <a:off x="1455420" y="1063388"/>
             <a:ext cx="8630920" cy="5639435"/>
           </a:xfrm>
           <a:prstGeom prst="rect">
@@ -5681,7 +6642,7 @@
 </p:sld>
 </file>
 
-<file path=ppt/slides/slide6.xml><?xml version="1.0" encoding="utf-8"?>
+<file path=ppt/slides/slide7.xml><?xml version="1.0" encoding="utf-8"?>
 <p:sld xmlns:a="http://schemas.openxmlformats.org/drawingml/2006/main" xmlns:r="http://schemas.openxmlformats.org/officeDocument/2006/relationships" xmlns:p="http://schemas.openxmlformats.org/presentationml/2006/main">
   <p:cSld>
     <p:bg>
@@ -5736,17 +6697,17 @@
           <a:p>
             <a:r>
               <a:rPr lang="en-US" b="1" dirty="0"/>
-              <a:t>Top Ten Object Types</a:t>
+              <a:t>Top Ten Object Classifications</a:t>
             </a:r>
           </a:p>
         </p:txBody>
       </p:sp>
       <p:pic>
         <p:nvPicPr>
-          <p:cNvPr id="11" name="Content Placeholder 10">
-            <a:extLst>
-              <a:ext uri="{FF2B5EF4-FFF2-40B4-BE49-F238E27FC236}">
-                <a16:creationId xmlns:a16="http://schemas.microsoft.com/office/drawing/2014/main" id="{2997935B-41BD-401D-8739-C59B9AE3FD7B}"/>
+          <p:cNvPr id="6" name="Content Placeholder 5">
+            <a:extLst>
+              <a:ext uri="{FF2B5EF4-FFF2-40B4-BE49-F238E27FC236}">
+                <a16:creationId xmlns:a16="http://schemas.microsoft.com/office/drawing/2014/main" id="{309DA57C-46F4-4EA2-BD0D-11C29B9E0226}"/>
               </a:ext>
             </a:extLst>
           </p:cNvPr>
@@ -5771,8 +6732,8 @@
         </p:blipFill>
         <p:spPr>
           <a:xfrm>
-            <a:off x="2270283" y="1391920"/>
-            <a:ext cx="7651433" cy="5100955"/>
+            <a:off x="2351314" y="1504837"/>
+            <a:ext cx="7482057" cy="4988037"/>
           </a:xfrm>
         </p:spPr>
       </p:pic>
@@ -5789,7 +6750,7 @@
 </p:sld>
 </file>
 
-<file path=ppt/slides/slide7.xml><?xml version="1.0" encoding="utf-8"?>
+<file path=ppt/slides/slide8.xml><?xml version="1.0" encoding="utf-8"?>
 <p:sld xmlns:a="http://schemas.openxmlformats.org/drawingml/2006/main" xmlns:r="http://schemas.openxmlformats.org/officeDocument/2006/relationships" xmlns:p="http://schemas.openxmlformats.org/presentationml/2006/main">
   <p:cSld>
     <p:bg>
@@ -5905,7 +6866,7 @@
 </p:sld>
 </file>
 
-<file path=ppt/slides/slide8.xml><?xml version="1.0" encoding="utf-8"?>
+<file path=ppt/slides/slide9.xml><?xml version="1.0" encoding="utf-8"?>
 <p:sld xmlns:a="http://schemas.openxmlformats.org/drawingml/2006/main" xmlns:r="http://schemas.openxmlformats.org/officeDocument/2006/relationships" xmlns:p="http://schemas.openxmlformats.org/presentationml/2006/main">
   <p:cSld>
     <p:bg>
@@ -5968,10 +6929,10 @@
       </p:sp>
       <p:pic>
         <p:nvPicPr>
-          <p:cNvPr id="11" name="Content Placeholder 10">
-            <a:extLst>
-              <a:ext uri="{FF2B5EF4-FFF2-40B4-BE49-F238E27FC236}">
-                <a16:creationId xmlns:a16="http://schemas.microsoft.com/office/drawing/2014/main" id="{5D3B1960-09ED-4686-AAB9-E9858A29B740}"/>
+          <p:cNvPr id="10" name="Content Placeholder 9">
+            <a:extLst>
+              <a:ext uri="{FF2B5EF4-FFF2-40B4-BE49-F238E27FC236}">
+                <a16:creationId xmlns:a16="http://schemas.microsoft.com/office/drawing/2014/main" id="{C982D3B9-2F3B-4EAC-A376-15DCD01759A1}"/>
               </a:ext>
             </a:extLst>
           </p:cNvPr>
@@ -5990,13 +6951,13 @@
               </a:ext>
             </a:extLst>
           </a:blip>
-          <a:srcRect l="14277" t="4119" r="2334" b="10891"/>
+          <a:srcRect l="4956" t="5834" b="13481"/>
           <a:stretch/>
         </p:blipFill>
         <p:spPr>
           <a:xfrm>
-            <a:off x="3542121" y="1287015"/>
-            <a:ext cx="5107757" cy="5205860"/>
+            <a:off x="3073414" y="1448031"/>
+            <a:ext cx="6045172" cy="5131929"/>
           </a:xfrm>
         </p:spPr>
       </p:pic>
@@ -6004,185 +6965,6 @@
     <p:extLst>
       <p:ext uri="{BB962C8B-B14F-4D97-AF65-F5344CB8AC3E}">
         <p14:creationId xmlns:p14="http://schemas.microsoft.com/office/powerpoint/2010/main" val="2032696390"/>
-      </p:ext>
-    </p:extLst>
-  </p:cSld>
-  <p:clrMapOvr>
-    <a:masterClrMapping/>
-  </p:clrMapOvr>
-</p:sld>
-</file>
-
-<file path=ppt/slides/slide9.xml><?xml version="1.0" encoding="utf-8"?>
-<p:sld xmlns:a="http://schemas.openxmlformats.org/drawingml/2006/main" xmlns:r="http://schemas.openxmlformats.org/officeDocument/2006/relationships" xmlns:p="http://schemas.openxmlformats.org/presentationml/2006/main">
-  <p:cSld>
-    <p:bg>
-      <p:bgPr>
-        <a:solidFill>
-          <a:schemeClr val="bg1"/>
-        </a:solidFill>
-        <a:effectLst/>
-      </p:bgPr>
-    </p:bg>
-    <p:spTree>
-      <p:nvGrpSpPr>
-        <p:cNvPr id="1" name=""/>
-        <p:cNvGrpSpPr/>
-        <p:nvPr/>
-      </p:nvGrpSpPr>
-      <p:grpSpPr>
-        <a:xfrm>
-          <a:off x="0" y="0"/>
-          <a:ext cx="0" cy="0"/>
-          <a:chOff x="0" y="0"/>
-          <a:chExt cx="0" cy="0"/>
-        </a:xfrm>
-      </p:grpSpPr>
-      <p:sp>
-        <p:nvSpPr>
-          <p:cNvPr id="2" name="Title 1">
-            <a:extLst>
-              <a:ext uri="{FF2B5EF4-FFF2-40B4-BE49-F238E27FC236}">
-                <a16:creationId xmlns:a16="http://schemas.microsoft.com/office/drawing/2014/main" id="{555D1F26-F171-4F89-9348-D8380221C40B}"/>
-              </a:ext>
-            </a:extLst>
-          </p:cNvPr>
-          <p:cNvSpPr>
-            <a:spLocks noGrp="1"/>
-          </p:cNvSpPr>
-          <p:nvPr>
-            <p:ph type="title"/>
-          </p:nvPr>
-        </p:nvSpPr>
-        <p:spPr>
-          <a:xfrm>
-            <a:off x="838200" y="114661"/>
-            <a:ext cx="10515600" cy="1325563"/>
-          </a:xfrm>
-        </p:spPr>
-        <p:txBody>
-          <a:bodyPr>
-            <a:normAutofit/>
-          </a:bodyPr>
-          <a:lstStyle/>
-          <a:p>
-            <a:r>
-              <a:rPr lang="en-US" sz="3600" dirty="0"/>
-              <a:t>Select Countries: Egypt Breakdown by Object Type</a:t>
-            </a:r>
-          </a:p>
-        </p:txBody>
-      </p:sp>
-      <p:sp>
-        <p:nvSpPr>
-          <p:cNvPr id="4" name="Text Placeholder 3">
-            <a:extLst>
-              <a:ext uri="{FF2B5EF4-FFF2-40B4-BE49-F238E27FC236}">
-                <a16:creationId xmlns:a16="http://schemas.microsoft.com/office/drawing/2014/main" id="{B9A91CA8-FBE0-4977-B36B-6EF552F23B97}"/>
-              </a:ext>
-            </a:extLst>
-          </p:cNvPr>
-          <p:cNvSpPr>
-            <a:spLocks noGrp="1"/>
-          </p:cNvSpPr>
-          <p:nvPr>
-            <p:ph type="body" sz="quarter" idx="3"/>
-          </p:nvPr>
-        </p:nvSpPr>
-        <p:spPr>
-          <a:xfrm>
-            <a:off x="7078077" y="1440224"/>
-            <a:ext cx="5183188" cy="500928"/>
-          </a:xfrm>
-        </p:spPr>
-        <p:txBody>
-          <a:bodyPr/>
-          <a:lstStyle/>
-          <a:p>
-            <a:pPr algn="ctr"/>
-            <a:r>
-              <a:rPr lang="en-US" dirty="0"/>
-              <a:t>Egyptian Sculpture</a:t>
-            </a:r>
-          </a:p>
-        </p:txBody>
-      </p:sp>
-      <p:pic>
-        <p:nvPicPr>
-          <p:cNvPr id="13" name="Content Placeholder 12">
-            <a:extLst>
-              <a:ext uri="{FF2B5EF4-FFF2-40B4-BE49-F238E27FC236}">
-                <a16:creationId xmlns:a16="http://schemas.microsoft.com/office/drawing/2014/main" id="{21B6AEBE-CEE3-435E-9FA7-0E91A6707A31}"/>
-              </a:ext>
-            </a:extLst>
-          </p:cNvPr>
-          <p:cNvPicPr>
-            <a:picLocks noGrp="1" noChangeAspect="1"/>
-          </p:cNvPicPr>
-          <p:nvPr>
-            <p:ph sz="quarter" idx="4"/>
-          </p:nvPr>
-        </p:nvPicPr>
-        <p:blipFill>
-          <a:blip r:embed="rId2">
-            <a:extLst>
-              <a:ext uri="{28A0092B-C50C-407E-A947-70E740481C1C}">
-                <a14:useLocalDpi xmlns:a14="http://schemas.microsoft.com/office/drawing/2010/main" val="0"/>
-              </a:ext>
-            </a:extLst>
-          </a:blip>
-          <a:stretch>
-            <a:fillRect/>
-          </a:stretch>
-        </p:blipFill>
-        <p:spPr>
-          <a:xfrm>
-            <a:off x="8239760" y="2007824"/>
-            <a:ext cx="2859823" cy="4289198"/>
-          </a:xfrm>
-          <a:effectLst>
-            <a:softEdge rad="127000"/>
-          </a:effectLst>
-        </p:spPr>
-      </p:pic>
-      <p:pic>
-        <p:nvPicPr>
-          <p:cNvPr id="21" name="Content Placeholder 20">
-            <a:extLst>
-              <a:ext uri="{FF2B5EF4-FFF2-40B4-BE49-F238E27FC236}">
-                <a16:creationId xmlns:a16="http://schemas.microsoft.com/office/drawing/2014/main" id="{FCA90C18-DFB5-48C4-B466-23AF6194B2E6}"/>
-              </a:ext>
-            </a:extLst>
-          </p:cNvPr>
-          <p:cNvPicPr>
-            <a:picLocks noGrp="1" noChangeAspect="1"/>
-          </p:cNvPicPr>
-          <p:nvPr>
-            <p:ph sz="half" idx="2"/>
-          </p:nvPr>
-        </p:nvPicPr>
-        <p:blipFill rotWithShape="1">
-          <a:blip r:embed="rId3">
-            <a:extLst>
-              <a:ext uri="{28A0092B-C50C-407E-A947-70E740481C1C}">
-                <a14:useLocalDpi xmlns:a14="http://schemas.microsoft.com/office/drawing/2010/main" val="0"/>
-              </a:ext>
-            </a:extLst>
-          </a:blip>
-          <a:srcRect l="18638" t="4532" b="11090"/>
-          <a:stretch/>
-        </p:blipFill>
-        <p:spPr>
-          <a:xfrm>
-            <a:off x="1317903" y="1338553"/>
-            <a:ext cx="5790437" cy="5004189"/>
-          </a:xfrm>
-        </p:spPr>
-      </p:pic>
-    </p:spTree>
-    <p:extLst>
-      <p:ext uri="{BB962C8B-B14F-4D97-AF65-F5344CB8AC3E}">
-        <p14:creationId xmlns:p14="http://schemas.microsoft.com/office/powerpoint/2010/main" val="2015169826"/>
       </p:ext>
     </p:extLst>
   </p:cSld>

</xml_diff>